<commit_message>
seminário 5 - v2
</commit_message>
<xml_diff>
--- a/Internet das Coisas (IoT) e Robótica.pptx
+++ b/Internet das Coisas (IoT) e Robótica.pptx
@@ -13,15 +13,17 @@
     <p:sldId id="261" r:id="rId7"/>
     <p:sldId id="265" r:id="rId8"/>
     <p:sldId id="260" r:id="rId9"/>
-    <p:sldId id="266" r:id="rId10"/>
-    <p:sldId id="272" r:id="rId11"/>
-    <p:sldId id="277" r:id="rId12"/>
-    <p:sldId id="269" r:id="rId13"/>
-    <p:sldId id="275" r:id="rId14"/>
-    <p:sldId id="270" r:id="rId15"/>
-    <p:sldId id="273" r:id="rId16"/>
-    <p:sldId id="274" r:id="rId17"/>
-    <p:sldId id="278" r:id="rId18"/>
+    <p:sldId id="279" r:id="rId10"/>
+    <p:sldId id="280" r:id="rId11"/>
+    <p:sldId id="266" r:id="rId12"/>
+    <p:sldId id="272" r:id="rId13"/>
+    <p:sldId id="277" r:id="rId14"/>
+    <p:sldId id="269" r:id="rId15"/>
+    <p:sldId id="275" r:id="rId16"/>
+    <p:sldId id="270" r:id="rId17"/>
+    <p:sldId id="273" r:id="rId18"/>
+    <p:sldId id="274" r:id="rId19"/>
+    <p:sldId id="278" r:id="rId20"/>
   </p:sldIdLst>
   <p:sldSz cx="9144000" cy="6858000" type="screen4x3"/>
   <p:notesSz cx="6858000" cy="9144000"/>
@@ -3896,7 +3898,7 @@
           <a:p>
             <a:r>
               <a:rPr lang="pt-BR" dirty="0" smtClean="0"/>
-              <a:t>Vantagens de RSSF/IoT + robôs</a:t>
+              <a:t>Robótica de enxame</a:t>
             </a:r>
             <a:endParaRPr lang="pt-BR" dirty="0"/>
           </a:p>
@@ -3914,76 +3916,79 @@
         </p:nvSpPr>
         <p:spPr/>
         <p:txBody>
-          <a:bodyPr>
-            <a:normAutofit fontScale="92500"/>
+          <a:bodyPr/>
+          <a:lstStyle/>
+          <a:p>
+            <a:endParaRPr lang="pt-BR" dirty="0"/>
+          </a:p>
+        </p:txBody>
+      </p:sp>
+      <p:pic>
+        <p:nvPicPr>
+          <p:cNvPr id="4" name="Picture 4" descr="Resultado de imagem para swarm robotics"/>
+          <p:cNvPicPr>
+            <a:picLocks noChangeAspect="1" noChangeArrowheads="1"/>
+          </p:cNvPicPr>
+          <p:nvPr/>
+        </p:nvPicPr>
+        <p:blipFill>
+          <a:blip r:embed="rId2" cstate="print">
+            <a:extLst>
+              <a:ext uri="{28A0092B-C50C-407E-A947-70E740481C1C}">
+                <a14:useLocalDpi xmlns:a14="http://schemas.microsoft.com/office/drawing/2010/main" val="0"/>
+              </a:ext>
+            </a:extLst>
+          </a:blip>
+          <a:srcRect/>
+          <a:stretch>
+            <a:fillRect/>
+          </a:stretch>
+        </p:blipFill>
+        <p:spPr bwMode="auto">
+          <a:xfrm>
+            <a:off x="1043608" y="1196752"/>
+            <a:ext cx="6480720" cy="4320481"/>
+          </a:xfrm>
+          <a:prstGeom prst="rect">
+            <a:avLst/>
+          </a:prstGeom>
+          <a:noFill/>
+          <a:extLst>
+            <a:ext uri="{909E8E84-426E-40DD-AFC4-6F175D3DCCD1}">
+              <a14:hiddenFill xmlns:a14="http://schemas.microsoft.com/office/drawing/2010/main">
+                <a:solidFill>
+                  <a:srgbClr val="FFFFFF"/>
+                </a:solidFill>
+              </a14:hiddenFill>
+            </a:ext>
+          </a:extLst>
+        </p:spPr>
+      </p:pic>
+      <p:sp>
+        <p:nvSpPr>
+          <p:cNvPr id="5" name="TextBox 4"/>
+          <p:cNvSpPr txBox="1"/>
+          <p:nvPr/>
+        </p:nvSpPr>
+        <p:spPr>
+          <a:xfrm>
+            <a:off x="1187624" y="5805264"/>
+            <a:ext cx="6776022" cy="369332"/>
+          </a:xfrm>
+          <a:prstGeom prst="rect">
+            <a:avLst/>
+          </a:prstGeom>
+          <a:noFill/>
+        </p:spPr>
+        <p:txBody>
+          <a:bodyPr wrap="none" rtlCol="0">
+            <a:spAutoFit/>
           </a:bodyPr>
           <a:lstStyle/>
           <a:p>
             <a:r>
-              <a:rPr lang="pt-BR" dirty="0" smtClean="0"/>
-              <a:t>Deployment de rede de sensores/objetos</a:t>
-            </a:r>
-          </a:p>
-          <a:p>
-            <a:r>
-              <a:rPr lang="pt-BR" dirty="0" smtClean="0"/>
-              <a:t>Localização</a:t>
-            </a:r>
-          </a:p>
-          <a:p>
-            <a:pPr lvl="1"/>
-            <a:r>
               <a:rPr lang="pt-BR" dirty="0"/>
-              <a:t>Robôs móveis quase sempre precisam se localizar no ambiente em que se encontram, e muitas vezes realizar o mapeamento da área </a:t>
-            </a:r>
-            <a:endParaRPr lang="pt-BR" dirty="0" smtClean="0"/>
-          </a:p>
-          <a:p>
-            <a:pPr lvl="1"/>
-            <a:r>
-              <a:rPr lang="pt-BR" dirty="0" smtClean="0"/>
-              <a:t>Robôs localizando sensores/objetos</a:t>
-            </a:r>
-          </a:p>
-          <a:p>
-            <a:pPr lvl="1"/>
-            <a:r>
-              <a:rPr lang="pt-BR" dirty="0" smtClean="0"/>
-              <a:t>Sensores/objetos auxiliando robôs na localização</a:t>
-            </a:r>
-          </a:p>
-          <a:p>
-            <a:pPr lvl="1"/>
-            <a:r>
-              <a:rPr lang="pt-BR" dirty="0" smtClean="0"/>
-              <a:t>Com o uso de RSSI – Radio Signal Strength Indicators</a:t>
-            </a:r>
-          </a:p>
-          <a:p>
-            <a:r>
-              <a:rPr lang="pt-BR" dirty="0" smtClean="0"/>
-              <a:t>Aumento da conectividade, confiabilidade e eficiência energética da rede</a:t>
-            </a:r>
-          </a:p>
-          <a:p>
-            <a:pPr lvl="1"/>
-            <a:r>
-              <a:rPr lang="pt-BR" dirty="0" smtClean="0"/>
-              <a:t>Coleta de dados de maneira mais eficiente</a:t>
-            </a:r>
-          </a:p>
-          <a:p>
-            <a:pPr lvl="1"/>
-            <a:r>
-              <a:rPr lang="pt-BR" dirty="0" smtClean="0"/>
-              <a:t>Redução de envios multi-hop</a:t>
-            </a:r>
-          </a:p>
-          <a:p>
-            <a:pPr lvl="1"/>
-            <a:r>
-              <a:rPr lang="pt-BR" dirty="0" smtClean="0"/>
-              <a:t>Diminuição do problema de afunilamento</a:t>
+              <a:t>Mil robôs – Harvard https://www.youtube.com/watch?v=G1t4M2XnIhI</a:t>
             </a:r>
           </a:p>
         </p:txBody>
@@ -3991,7 +3996,7 @@
     </p:spTree>
     <p:extLst>
       <p:ext uri="{BB962C8B-B14F-4D97-AF65-F5344CB8AC3E}">
-        <p14:creationId xmlns:p14="http://schemas.microsoft.com/office/powerpoint/2010/main" val="2323575634"/>
+        <p14:creationId xmlns:p14="http://schemas.microsoft.com/office/powerpoint/2010/main" val="3593233362"/>
       </p:ext>
     </p:extLst>
   </p:cSld>
@@ -4033,7 +4038,270 @@
           <a:bodyPr/>
           <a:lstStyle/>
           <a:p>
-            <a:endParaRPr lang="pt-BR"/>
+            <a:r>
+              <a:rPr lang="pt-BR" dirty="0" smtClean="0"/>
+              <a:t>Internet das Coisas Robóticas</a:t>
+            </a:r>
+            <a:endParaRPr lang="pt-BR" dirty="0"/>
+          </a:p>
+        </p:txBody>
+      </p:sp>
+      <p:sp>
+        <p:nvSpPr>
+          <p:cNvPr id="3" name="Content Placeholder 2"/>
+          <p:cNvSpPr>
+            <a:spLocks noGrp="1"/>
+          </p:cNvSpPr>
+          <p:nvPr>
+            <p:ph sz="quarter" idx="1"/>
+          </p:nvPr>
+        </p:nvSpPr>
+        <p:spPr/>
+        <p:txBody>
+          <a:bodyPr/>
+          <a:lstStyle/>
+          <a:p>
+            <a:r>
+              <a:rPr lang="pt-BR" dirty="0" smtClean="0"/>
+              <a:t>Apontado por alguns como o próximo passo da Internet das Coisas, acrescentando novas possibilidades</a:t>
+            </a:r>
+          </a:p>
+          <a:p>
+            <a:r>
+              <a:rPr lang="pt-BR" dirty="0"/>
+              <a:t>Será possível controlar robôs domésticos pela internet da maneira que se controla um termostato por celular</a:t>
+            </a:r>
+          </a:p>
+          <a:p>
+            <a:r>
+              <a:rPr lang="pt-BR" dirty="0" smtClean="0"/>
+              <a:t>Os robôs não se limitam mais aos seus próprios sensores para perceber o ambiente – grande disponibilidade de dados de dispositivos e ambientes inteligentes</a:t>
+            </a:r>
+          </a:p>
+          <a:p>
+            <a:r>
+              <a:rPr lang="pt-BR" dirty="0" smtClean="0"/>
+              <a:t>Robôs poderão usar bases de dados na internet – mapas, receitas, palavras, objetos, movimentos</a:t>
+            </a:r>
+          </a:p>
+          <a:p>
+            <a:endParaRPr lang="pt-BR" dirty="0" smtClean="0"/>
+          </a:p>
+          <a:p>
+            <a:endParaRPr lang="pt-BR" dirty="0" smtClean="0"/>
+          </a:p>
+          <a:p>
+            <a:endParaRPr lang="pt-BR" dirty="0"/>
+          </a:p>
+        </p:txBody>
+      </p:sp>
+    </p:spTree>
+    <p:extLst>
+      <p:ext uri="{BB962C8B-B14F-4D97-AF65-F5344CB8AC3E}">
+        <p14:creationId xmlns:p14="http://schemas.microsoft.com/office/powerpoint/2010/main" val="2543123065"/>
+      </p:ext>
+    </p:extLst>
+  </p:cSld>
+  <p:clrMapOvr>
+    <a:masterClrMapping/>
+  </p:clrMapOvr>
+</p:sld>
+</file>
+
+<file path=ppt/slides/slide12.xml><?xml version="1.0" encoding="utf-8"?>
+<p:sld xmlns:a="http://schemas.openxmlformats.org/drawingml/2006/main" xmlns:r="http://schemas.openxmlformats.org/officeDocument/2006/relationships" xmlns:p="http://schemas.openxmlformats.org/presentationml/2006/main">
+  <p:cSld>
+    <p:spTree>
+      <p:nvGrpSpPr>
+        <p:cNvPr id="1" name=""/>
+        <p:cNvGrpSpPr/>
+        <p:nvPr/>
+      </p:nvGrpSpPr>
+      <p:grpSpPr>
+        <a:xfrm>
+          <a:off x="0" y="0"/>
+          <a:ext cx="0" cy="0"/>
+          <a:chOff x="0" y="0"/>
+          <a:chExt cx="0" cy="0"/>
+        </a:xfrm>
+      </p:grpSpPr>
+      <p:sp>
+        <p:nvSpPr>
+          <p:cNvPr id="2" name="Title 1"/>
+          <p:cNvSpPr>
+            <a:spLocks noGrp="1"/>
+          </p:cNvSpPr>
+          <p:nvPr>
+            <p:ph type="title"/>
+          </p:nvPr>
+        </p:nvSpPr>
+        <p:spPr/>
+        <p:txBody>
+          <a:bodyPr/>
+          <a:lstStyle/>
+          <a:p>
+            <a:r>
+              <a:rPr lang="pt-BR" dirty="0" smtClean="0"/>
+              <a:t>Vantagens de RSSF/IoT + robôs</a:t>
+            </a:r>
+            <a:endParaRPr lang="pt-BR" dirty="0"/>
+          </a:p>
+        </p:txBody>
+      </p:sp>
+      <p:sp>
+        <p:nvSpPr>
+          <p:cNvPr id="3" name="Content Placeholder 2"/>
+          <p:cNvSpPr>
+            <a:spLocks noGrp="1"/>
+          </p:cNvSpPr>
+          <p:nvPr>
+            <p:ph sz="quarter" idx="1"/>
+          </p:nvPr>
+        </p:nvSpPr>
+        <p:spPr/>
+        <p:txBody>
+          <a:bodyPr>
+            <a:normAutofit fontScale="92500"/>
+          </a:bodyPr>
+          <a:lstStyle/>
+          <a:p>
+            <a:r>
+              <a:rPr lang="pt-BR" dirty="0" smtClean="0"/>
+              <a:t>Deployment de rede de sensores/objetos</a:t>
+            </a:r>
+          </a:p>
+          <a:p>
+            <a:r>
+              <a:rPr lang="pt-BR" dirty="0" smtClean="0"/>
+              <a:t>Localização</a:t>
+            </a:r>
+          </a:p>
+          <a:p>
+            <a:pPr lvl="1"/>
+            <a:r>
+              <a:rPr lang="pt-BR" dirty="0"/>
+              <a:t>Robôs móveis quase sempre precisam se localizar no ambiente em que se encontram, e muitas vezes realizar o mapeamento da área </a:t>
+            </a:r>
+            <a:endParaRPr lang="pt-BR" dirty="0" smtClean="0"/>
+          </a:p>
+          <a:p>
+            <a:pPr lvl="1"/>
+            <a:r>
+              <a:rPr lang="pt-BR" dirty="0" smtClean="0"/>
+              <a:t>Robôs localizando sensores/objetos</a:t>
+            </a:r>
+          </a:p>
+          <a:p>
+            <a:pPr lvl="1"/>
+            <a:r>
+              <a:rPr lang="pt-BR" dirty="0" smtClean="0"/>
+              <a:t>Sensores/objetos auxiliando robôs na localização</a:t>
+            </a:r>
+          </a:p>
+          <a:p>
+            <a:pPr lvl="1"/>
+            <a:r>
+              <a:rPr lang="pt-BR" dirty="0" smtClean="0"/>
+              <a:t>Com o uso de RSSI – Radio Signal Strength Indicators</a:t>
+            </a:r>
+          </a:p>
+          <a:p>
+            <a:r>
+              <a:rPr lang="pt-BR" dirty="0" smtClean="0"/>
+              <a:t>Aumento da conectividade, confiabilidade e eficiência energética da rede</a:t>
+            </a:r>
+          </a:p>
+          <a:p>
+            <a:pPr lvl="1"/>
+            <a:r>
+              <a:rPr lang="pt-BR" dirty="0" smtClean="0"/>
+              <a:t>Coleta de dados de maneira mais eficiente</a:t>
+            </a:r>
+          </a:p>
+          <a:p>
+            <a:pPr lvl="1"/>
+            <a:r>
+              <a:rPr lang="pt-BR" dirty="0" smtClean="0"/>
+              <a:t>Redução de envios multi-hop</a:t>
+            </a:r>
+          </a:p>
+          <a:p>
+            <a:pPr lvl="1"/>
+            <a:r>
+              <a:rPr lang="pt-BR" dirty="0" smtClean="0"/>
+              <a:t>Diminuição do problema de afunilamento</a:t>
+            </a:r>
+          </a:p>
+        </p:txBody>
+      </p:sp>
+    </p:spTree>
+    <p:extLst>
+      <p:ext uri="{BB962C8B-B14F-4D97-AF65-F5344CB8AC3E}">
+        <p14:creationId xmlns:p14="http://schemas.microsoft.com/office/powerpoint/2010/main" val="2323575634"/>
+      </p:ext>
+    </p:extLst>
+  </p:cSld>
+  <p:clrMapOvr>
+    <a:masterClrMapping/>
+  </p:clrMapOvr>
+</p:sld>
+</file>
+
+<file path=ppt/slides/slide13.xml><?xml version="1.0" encoding="utf-8"?>
+<p:sld xmlns:a="http://schemas.openxmlformats.org/drawingml/2006/main" xmlns:r="http://schemas.openxmlformats.org/officeDocument/2006/relationships" xmlns:p="http://schemas.openxmlformats.org/presentationml/2006/main">
+  <p:cSld>
+    <p:spTree>
+      <p:nvGrpSpPr>
+        <p:cNvPr id="1" name=""/>
+        <p:cNvGrpSpPr/>
+        <p:nvPr/>
+      </p:nvGrpSpPr>
+      <p:grpSpPr>
+        <a:xfrm>
+          <a:off x="0" y="0"/>
+          <a:ext cx="0" cy="0"/>
+          <a:chOff x="0" y="0"/>
+          <a:chExt cx="0" cy="0"/>
+        </a:xfrm>
+      </p:grpSpPr>
+      <p:sp>
+        <p:nvSpPr>
+          <p:cNvPr id="2" name="Title 1"/>
+          <p:cNvSpPr>
+            <a:spLocks noGrp="1"/>
+          </p:cNvSpPr>
+          <p:nvPr>
+            <p:ph type="title"/>
+          </p:nvPr>
+        </p:nvSpPr>
+        <p:spPr/>
+        <p:txBody>
+          <a:bodyPr>
+            <a:normAutofit fontScale="90000"/>
+          </a:bodyPr>
+          <a:lstStyle/>
+          <a:p>
+            <a:r>
+              <a:rPr lang="pt-BR" dirty="0" smtClean="0"/>
+              <a:t>RSSF + Robôs</a:t>
+            </a:r>
+            <a:r>
+              <a:rPr lang="pt-BR" dirty="0"/>
+              <a:t>: </a:t>
+            </a:r>
+            <a:r>
+              <a:rPr lang="pt-BR" dirty="0" smtClean="0"/>
+              <a:t>maior conectividade</a:t>
+            </a:r>
+            <a:r>
+              <a:rPr lang="pt-BR" dirty="0"/>
+              <a:t>, confiabilidade e eficiência </a:t>
+            </a:r>
+            <a:r>
+              <a:rPr lang="pt-BR" dirty="0" smtClean="0"/>
+              <a:t>energética da rede</a:t>
+            </a:r>
+            <a:endParaRPr lang="pt-BR" dirty="0"/>
           </a:p>
         </p:txBody>
       </p:sp>
@@ -4098,7 +4366,7 @@
         <p:spPr bwMode="auto">
           <a:xfrm>
             <a:off x="755576" y="1700808"/>
-            <a:ext cx="4057524" cy="2412000"/>
+            <a:ext cx="3528392" cy="2097457"/>
           </a:xfrm>
           <a:prstGeom prst="rect">
             <a:avLst/>
@@ -4146,8 +4414,8 @@
         </p:nvSpPr>
         <p:spPr>
           <a:xfrm>
-            <a:off x="1043608" y="4221088"/>
-            <a:ext cx="3240360" cy="369332"/>
+            <a:off x="1331640" y="3865820"/>
+            <a:ext cx="1512168" cy="369332"/>
           </a:xfrm>
           <a:prstGeom prst="rect">
             <a:avLst/>
@@ -4168,54 +4436,31 @@
           </a:p>
         </p:txBody>
       </p:sp>
-    </p:spTree>
-    <p:extLst>
-      <p:ext uri="{BB962C8B-B14F-4D97-AF65-F5344CB8AC3E}">
-        <p14:creationId xmlns:p14="http://schemas.microsoft.com/office/powerpoint/2010/main" val="676601734"/>
-      </p:ext>
-    </p:extLst>
-  </p:cSld>
-  <p:clrMapOvr>
-    <a:masterClrMapping/>
-  </p:clrMapOvr>
-</p:sld>
-</file>
-
-<file path=ppt/slides/slide12.xml><?xml version="1.0" encoding="utf-8"?>
-<p:sld xmlns:a="http://schemas.openxmlformats.org/drawingml/2006/main" xmlns:r="http://schemas.openxmlformats.org/officeDocument/2006/relationships" xmlns:p="http://schemas.openxmlformats.org/presentationml/2006/main">
-  <p:cSld>
-    <p:spTree>
-      <p:nvGrpSpPr>
-        <p:cNvPr id="1" name=""/>
-        <p:cNvGrpSpPr/>
-        <p:nvPr/>
-      </p:nvGrpSpPr>
-      <p:grpSpPr>
-        <a:xfrm>
-          <a:off x="0" y="0"/>
-          <a:ext cx="0" cy="0"/>
-          <a:chOff x="0" y="0"/>
-          <a:chExt cx="0" cy="0"/>
-        </a:xfrm>
-      </p:grpSpPr>
-      <p:sp>
-        <p:nvSpPr>
-          <p:cNvPr id="2" name="Title 1"/>
-          <p:cNvSpPr>
-            <a:spLocks noGrp="1"/>
-          </p:cNvSpPr>
-          <p:nvPr>
-            <p:ph type="title"/>
-          </p:nvPr>
-        </p:nvSpPr>
-        <p:spPr/>
-        <p:txBody>
-          <a:bodyPr/>
-          <a:lstStyle/>
-          <a:p>
-            <a:r>
-              <a:rPr lang="pt-BR" dirty="0" smtClean="0"/>
-              <a:t>Robôs Domésticos</a:t>
+      <p:sp>
+        <p:nvSpPr>
+          <p:cNvPr id="7" name="TextBox 6"/>
+          <p:cNvSpPr txBox="1"/>
+          <p:nvPr/>
+        </p:nvSpPr>
+        <p:spPr>
+          <a:xfrm>
+            <a:off x="6089530" y="4368786"/>
+            <a:ext cx="1512168" cy="369332"/>
+          </a:xfrm>
+          <a:prstGeom prst="rect">
+            <a:avLst/>
+          </a:prstGeom>
+          <a:noFill/>
+        </p:spPr>
+        <p:txBody>
+          <a:bodyPr wrap="square" rtlCol="0">
+            <a:spAutoFit/>
+          </a:bodyPr>
+          <a:lstStyle/>
+          <a:p>
+            <a:r>
+              <a:rPr lang="pt-BR" dirty="0" smtClean="0"/>
+              <a:t>Data Mules</a:t>
             </a:r>
             <a:endParaRPr lang="pt-BR" dirty="0"/>
           </a:p>
@@ -4223,86 +4468,16 @@
       </p:sp>
       <p:sp>
         <p:nvSpPr>
-          <p:cNvPr id="3" name="Content Placeholder 2"/>
-          <p:cNvSpPr>
-            <a:spLocks noGrp="1"/>
-          </p:cNvSpPr>
-          <p:nvPr>
-            <p:ph sz="quarter" idx="1"/>
-          </p:nvPr>
-        </p:nvSpPr>
-        <p:spPr/>
-        <p:txBody>
-          <a:bodyPr/>
-          <a:lstStyle/>
-          <a:p>
-            <a:r>
-              <a:rPr lang="pt-BR" dirty="0" smtClean="0"/>
-              <a:t>Presente: robôs aspiradores</a:t>
-            </a:r>
-          </a:p>
-          <a:p>
-            <a:pPr lvl="1"/>
-            <a:r>
-              <a:rPr lang="pt-BR" dirty="0" smtClean="0"/>
-              <a:t>Roomba e similares – já existem versões IoRT</a:t>
-            </a:r>
-          </a:p>
-          <a:p>
-            <a:r>
-              <a:rPr lang="pt-BR" dirty="0" smtClean="0"/>
-              <a:t>Robôs autônomos</a:t>
-            </a:r>
-          </a:p>
-          <a:p>
-            <a:pPr lvl="1"/>
-            <a:r>
-              <a:rPr lang="pt-BR" dirty="0" smtClean="0"/>
-              <a:t>Capazes de realizar tarefas diversas e de interação social</a:t>
-            </a:r>
-          </a:p>
-          <a:p>
-            <a:pPr lvl="1"/>
-            <a:r>
-              <a:rPr lang="pt-BR" dirty="0" smtClean="0"/>
-              <a:t>Para ajusar idosos e pessoas com necessidades especiais</a:t>
-            </a:r>
-          </a:p>
-          <a:p>
-            <a:pPr lvl="1"/>
-            <a:r>
-              <a:rPr lang="pt-BR" dirty="0" smtClean="0"/>
-              <a:t>Competição RoboCup @Home</a:t>
-            </a:r>
-            <a:endParaRPr lang="pt-BR" dirty="0"/>
-          </a:p>
-        </p:txBody>
-      </p:sp>
-      <p:pic>
-        <p:nvPicPr>
-          <p:cNvPr id="2050" name="Picture 2" descr="http://www.ok-produkt.cz/Files/560_m1.jpg"/>
-          <p:cNvPicPr>
-            <a:picLocks noChangeAspect="1" noChangeArrowheads="1"/>
-          </p:cNvPicPr>
+          <p:cNvPr id="3" name="AutoShape 4" descr="Resultado de imagem para robot icon"/>
+          <p:cNvSpPr>
+            <a:spLocks noChangeAspect="1" noChangeArrowheads="1"/>
+          </p:cNvSpPr>
           <p:nvPr/>
-        </p:nvPicPr>
-        <p:blipFill>
-          <a:blip r:embed="rId2" cstate="print">
-            <a:extLst>
-              <a:ext uri="{28A0092B-C50C-407E-A947-70E740481C1C}">
-                <a14:useLocalDpi xmlns:a14="http://schemas.microsoft.com/office/drawing/2010/main" val="0"/>
-              </a:ext>
-            </a:extLst>
-          </a:blip>
-          <a:srcRect/>
-          <a:stretch>
-            <a:fillRect/>
-          </a:stretch>
-        </p:blipFill>
+        </p:nvSpPr>
         <p:spPr bwMode="auto">
           <a:xfrm>
-            <a:off x="611560" y="3898412"/>
-            <a:ext cx="3307054" cy="2511524"/>
+            <a:off x="307975" y="7937"/>
+            <a:ext cx="304800" cy="304801"/>
           </a:xfrm>
           <a:prstGeom prst="rect">
             <a:avLst/>
@@ -4318,10 +4493,21 @@
             </a:ext>
           </a:extLst>
         </p:spPr>
-      </p:pic>
+        <p:txBody>
+          <a:bodyPr vert="horz" wrap="square" lIns="91440" tIns="45720" rIns="91440" bIns="45720" numCol="1" anchor="t" anchorCtr="0" compatLnSpc="1">
+            <a:prstTxWarp prst="textNoShape">
+              <a:avLst/>
+            </a:prstTxWarp>
+          </a:bodyPr>
+          <a:lstStyle/>
+          <a:p>
+            <a:endParaRPr lang="pt-BR"/>
+          </a:p>
+        </p:txBody>
+      </p:sp>
       <p:pic>
         <p:nvPicPr>
-          <p:cNvPr id="2052" name="Picture 4" descr="http://whatsnext.nuance.com/wp-content/uploads/Team-RoCKIn-robot-lisa.jpg"/>
+          <p:cNvPr id="1030" name="Picture 6"/>
           <p:cNvPicPr>
             <a:picLocks noChangeAspect="1" noChangeArrowheads="1"/>
           </p:cNvPicPr>
@@ -4342,164 +4528,8 @@
         </p:blipFill>
         <p:spPr bwMode="auto">
           <a:xfrm>
-            <a:off x="5494972" y="3853105"/>
-            <a:ext cx="3469516" cy="2602137"/>
-          </a:xfrm>
-          <a:prstGeom prst="rect">
-            <a:avLst/>
-          </a:prstGeom>
-          <a:noFill/>
-          <a:extLst>
-            <a:ext uri="{909E8E84-426E-40DD-AFC4-6F175D3DCCD1}">
-              <a14:hiddenFill xmlns:a14="http://schemas.microsoft.com/office/drawing/2010/main">
-                <a:solidFill>
-                  <a:srgbClr val="FFFFFF"/>
-                </a:solidFill>
-              </a14:hiddenFill>
-            </a:ext>
-          </a:extLst>
-        </p:spPr>
-      </p:pic>
-    </p:spTree>
-    <p:extLst>
-      <p:ext uri="{BB962C8B-B14F-4D97-AF65-F5344CB8AC3E}">
-        <p14:creationId xmlns:p14="http://schemas.microsoft.com/office/powerpoint/2010/main" val="3735369947"/>
-      </p:ext>
-    </p:extLst>
-  </p:cSld>
-  <p:clrMapOvr>
-    <a:masterClrMapping/>
-  </p:clrMapOvr>
-</p:sld>
-</file>
-
-<file path=ppt/slides/slide13.xml><?xml version="1.0" encoding="utf-8"?>
-<p:sld xmlns:a="http://schemas.openxmlformats.org/drawingml/2006/main" xmlns:r="http://schemas.openxmlformats.org/officeDocument/2006/relationships" xmlns:p="http://schemas.openxmlformats.org/presentationml/2006/main">
-  <p:cSld>
-    <p:spTree>
-      <p:nvGrpSpPr>
-        <p:cNvPr id="1" name=""/>
-        <p:cNvGrpSpPr/>
-        <p:nvPr/>
-      </p:nvGrpSpPr>
-      <p:grpSpPr>
-        <a:xfrm>
-          <a:off x="0" y="0"/>
-          <a:ext cx="0" cy="0"/>
-          <a:chOff x="0" y="0"/>
-          <a:chExt cx="0" cy="0"/>
-        </a:xfrm>
-      </p:grpSpPr>
-      <p:sp>
-        <p:nvSpPr>
-          <p:cNvPr id="2" name="Title 1"/>
-          <p:cNvSpPr>
-            <a:spLocks noGrp="1"/>
-          </p:cNvSpPr>
-          <p:nvPr>
-            <p:ph type="title"/>
-          </p:nvPr>
-        </p:nvSpPr>
-        <p:spPr/>
-        <p:txBody>
-          <a:bodyPr/>
-          <a:lstStyle/>
-          <a:p>
-            <a:r>
-              <a:rPr lang="pt-BR" dirty="0" smtClean="0"/>
-              <a:t>Warehouses</a:t>
-            </a:r>
-            <a:endParaRPr lang="pt-BR" dirty="0"/>
-          </a:p>
-        </p:txBody>
-      </p:sp>
-      <p:sp>
-        <p:nvSpPr>
-          <p:cNvPr id="3" name="Content Placeholder 2"/>
-          <p:cNvSpPr>
-            <a:spLocks noGrp="1"/>
-          </p:cNvSpPr>
-          <p:nvPr>
-            <p:ph sz="quarter" idx="1"/>
-          </p:nvPr>
-        </p:nvSpPr>
-        <p:spPr>
-          <a:xfrm>
-            <a:off x="457200" y="1219200"/>
-            <a:ext cx="8229600" cy="3217912"/>
-          </a:xfrm>
-        </p:spPr>
-        <p:txBody>
-          <a:bodyPr>
-            <a:normAutofit fontScale="92500" lnSpcReduction="10000"/>
-          </a:bodyPr>
-          <a:lstStyle/>
-          <a:p>
-            <a:r>
-              <a:rPr lang="pt-BR" dirty="0" smtClean="0"/>
-              <a:t>Robôs já são amplamente utilizados</a:t>
-            </a:r>
-          </a:p>
-          <a:p>
-            <a:r>
-              <a:rPr lang="pt-BR" dirty="0" smtClean="0"/>
-              <a:t>Amazon adquiriu a Kiva em 2012 por US$775 milhões </a:t>
-            </a:r>
-          </a:p>
-          <a:p>
-            <a:pPr lvl="1"/>
-            <a:r>
-              <a:rPr lang="pt-BR" dirty="0" smtClean="0"/>
-              <a:t>Mudou o nome para Amazon Robotics e deixou de atender todos os demais clientes – GAP,  Walgreens, Office Depot e muitos outros</a:t>
-            </a:r>
-          </a:p>
-          <a:p>
-            <a:pPr lvl="1"/>
-            <a:r>
-              <a:rPr lang="pt-BR" dirty="0" smtClean="0"/>
-              <a:t>Mais de 30 mil robôs em seus depósitos</a:t>
-            </a:r>
-          </a:p>
-          <a:p>
-            <a:r>
-              <a:rPr lang="pt-BR" dirty="0" smtClean="0"/>
-              <a:t>Ambientes com sensores, produtos e pallets com tags RFID – auxiliam o robô na tarefa de localizar e transportar produtos</a:t>
-            </a:r>
-          </a:p>
-          <a:p>
-            <a:r>
-              <a:rPr lang="pt-BR" dirty="0" smtClean="0"/>
-              <a:t>Robô pode ser acionado assim que um pedido online é feito</a:t>
-            </a:r>
-            <a:endParaRPr lang="pt-BR" dirty="0"/>
-          </a:p>
-        </p:txBody>
-      </p:sp>
-      <p:pic>
-        <p:nvPicPr>
-          <p:cNvPr id="4098" name="Picture 2"/>
-          <p:cNvPicPr>
-            <a:picLocks noChangeAspect="1" noChangeArrowheads="1"/>
-          </p:cNvPicPr>
-          <p:nvPr/>
-        </p:nvPicPr>
-        <p:blipFill>
-          <a:blip r:embed="rId2">
-            <a:extLst>
-              <a:ext uri="{28A0092B-C50C-407E-A947-70E740481C1C}">
-                <a14:useLocalDpi xmlns:a14="http://schemas.microsoft.com/office/drawing/2010/main" val="0"/>
-              </a:ext>
-            </a:extLst>
-          </a:blip>
-          <a:srcRect/>
-          <a:stretch>
-            <a:fillRect/>
-          </a:stretch>
-        </p:blipFill>
-        <p:spPr bwMode="auto">
-          <a:xfrm>
-            <a:off x="467544" y="4293096"/>
-            <a:ext cx="4002539" cy="2138164"/>
+            <a:off x="4953209" y="1130286"/>
+            <a:ext cx="3581400" cy="3238500"/>
           </a:xfrm>
           <a:prstGeom prst="rect">
             <a:avLst/>
@@ -4539,10 +4569,80 @@
           </a:extLst>
         </p:spPr>
       </p:pic>
+      <p:sp>
+        <p:nvSpPr>
+          <p:cNvPr id="12" name="Content Placeholder 2"/>
+          <p:cNvSpPr>
+            <a:spLocks noGrp="1"/>
+          </p:cNvSpPr>
+          <p:nvPr>
+            <p:ph sz="quarter" idx="1"/>
+          </p:nvPr>
+        </p:nvSpPr>
+        <p:spPr>
+          <a:xfrm>
+            <a:off x="457200" y="4738118"/>
+            <a:ext cx="8229600" cy="1643210"/>
+          </a:xfrm>
+        </p:spPr>
+        <p:txBody>
+          <a:bodyPr>
+            <a:normAutofit fontScale="85000" lnSpcReduction="20000"/>
+          </a:bodyPr>
+          <a:lstStyle/>
+          <a:p>
+            <a:r>
+              <a:rPr lang="pt-BR" dirty="0" smtClean="0"/>
+              <a:t>Os robôs podem ser usados como</a:t>
+            </a:r>
+          </a:p>
+          <a:p>
+            <a:pPr lvl="1"/>
+            <a:r>
+              <a:rPr lang="pt-BR" dirty="0" smtClean="0"/>
+              <a:t>Data Mules</a:t>
+            </a:r>
+          </a:p>
+          <a:p>
+            <a:pPr lvl="1"/>
+            <a:r>
+              <a:rPr lang="pt-BR" dirty="0" smtClean="0"/>
+              <a:t>Estações-base móveis</a:t>
+            </a:r>
+          </a:p>
+          <a:p>
+            <a:pPr lvl="1"/>
+            <a:r>
+              <a:rPr lang="pt-BR" dirty="0" smtClean="0"/>
+              <a:t>Nós que se posicionam de maneira otimizada (em redes mesh)</a:t>
+            </a:r>
+          </a:p>
+          <a:p>
+            <a:pPr lvl="1"/>
+            <a:r>
+              <a:rPr lang="pt-BR" dirty="0" smtClean="0"/>
+              <a:t>Meio para (re)posicionar os sensores de maneira otimizada</a:t>
+            </a:r>
+            <a:endParaRPr lang="pt-BR" dirty="0" smtClean="0"/>
+          </a:p>
+          <a:p>
+            <a:pPr lvl="1"/>
+            <a:endParaRPr lang="pt-BR" dirty="0" smtClean="0"/>
+          </a:p>
+          <a:p>
+            <a:pPr lvl="1"/>
+            <a:endParaRPr lang="pt-BR" dirty="0" smtClean="0"/>
+          </a:p>
+          <a:p>
+            <a:pPr lvl="1"/>
+            <a:endParaRPr lang="pt-BR" dirty="0" smtClean="0"/>
+          </a:p>
+        </p:txBody>
+      </p:sp>
     </p:spTree>
     <p:extLst>
       <p:ext uri="{BB962C8B-B14F-4D97-AF65-F5344CB8AC3E}">
-        <p14:creationId xmlns:p14="http://schemas.microsoft.com/office/powerpoint/2010/main" val="3511222835"/>
+        <p14:creationId xmlns:p14="http://schemas.microsoft.com/office/powerpoint/2010/main" val="676601734"/>
       </p:ext>
     </p:extLst>
   </p:cSld>
@@ -4586,7 +4686,7 @@
           <a:p>
             <a:r>
               <a:rPr lang="pt-BR" dirty="0" smtClean="0"/>
-              <a:t>Outros Setores</a:t>
+              <a:t>Robôs Domésticos</a:t>
             </a:r>
             <a:endParaRPr lang="pt-BR" dirty="0"/>
           </a:p>
@@ -4604,100 +4704,137 @@
         </p:nvSpPr>
         <p:spPr/>
         <p:txBody>
-          <a:bodyPr>
-            <a:normAutofit lnSpcReduction="10000"/>
-          </a:bodyPr>
-          <a:lstStyle/>
-          <a:p>
-            <a:r>
-              <a:rPr lang="pt-BR" dirty="0" smtClean="0"/>
-              <a:t>Cidades Inteligentes</a:t>
+          <a:bodyPr/>
+          <a:lstStyle/>
+          <a:p>
+            <a:r>
+              <a:rPr lang="pt-BR" dirty="0" smtClean="0"/>
+              <a:t>Presente: robôs aspiradores</a:t>
             </a:r>
           </a:p>
           <a:p>
             <a:pPr lvl="1"/>
             <a:r>
               <a:rPr lang="pt-BR" dirty="0" smtClean="0"/>
-              <a:t>Coleta automática de lixo</a:t>
+              <a:t>Roomba e similares – já existem versões IoRT</a:t>
+            </a:r>
+          </a:p>
+          <a:p>
+            <a:r>
+              <a:rPr lang="pt-BR" dirty="0" smtClean="0"/>
+              <a:t>Robôs autônomos</a:t>
             </a:r>
           </a:p>
           <a:p>
             <a:pPr lvl="1"/>
             <a:r>
               <a:rPr lang="pt-BR" dirty="0" smtClean="0"/>
-              <a:t>Segurança e monitoramento com uso de drones</a:t>
-            </a:r>
-          </a:p>
-          <a:p>
-            <a:r>
-              <a:rPr lang="pt-BR" dirty="0" smtClean="0"/>
-              <a:t>Indústrias</a:t>
+              <a:t>Capazes de realizar tarefas diversas e de interação social</a:t>
             </a:r>
           </a:p>
           <a:p>
             <a:pPr lvl="1"/>
             <a:r>
               <a:rPr lang="pt-BR" dirty="0" smtClean="0"/>
-              <a:t>Robôs já são lugar comum e serão integrados com IoT conforme for sendo implantada</a:t>
+              <a:t>Para ajusar idosos e pessoas com necessidades especiais</a:t>
             </a:r>
           </a:p>
           <a:p>
             <a:pPr lvl="1"/>
             <a:r>
-              <a:rPr lang="pt-BR" dirty="0"/>
-              <a:t>S</a:t>
-            </a:r>
-            <a:r>
-              <a:rPr lang="pt-BR" dirty="0" smtClean="0"/>
-              <a:t>e tornarão mais inteligentes</a:t>
-            </a:r>
-          </a:p>
-          <a:p>
-            <a:r>
-              <a:rPr lang="pt-BR" dirty="0" smtClean="0"/>
-              <a:t>Varejo</a:t>
-            </a:r>
-          </a:p>
-          <a:p>
-            <a:pPr lvl="1"/>
-            <a:r>
-              <a:rPr lang="pt-BR" dirty="0" smtClean="0"/>
-              <a:t>Atendentes/vendedores robóticos</a:t>
-            </a:r>
-          </a:p>
-          <a:p>
-            <a:pPr lvl="1"/>
-            <a:r>
-              <a:rPr lang="pt-BR" dirty="0" smtClean="0"/>
-              <a:t>Armazenar e buscar produtos – como em depósitos</a:t>
-            </a:r>
-          </a:p>
-          <a:p>
-            <a:r>
-              <a:rPr lang="pt-BR" dirty="0" smtClean="0"/>
-              <a:t>Automóveis</a:t>
-            </a:r>
-          </a:p>
-          <a:p>
-            <a:pPr lvl="1"/>
-            <a:r>
-              <a:rPr lang="pt-BR" dirty="0" smtClean="0"/>
-              <a:t>Carro autônomo </a:t>
-            </a:r>
-            <a:r>
-              <a:rPr lang="pt-BR" dirty="0" smtClean="0">
-                <a:sym typeface="Wingdings" pitchFamily="2" charset="2"/>
-              </a:rPr>
-              <a:t> Robô móvel</a:t>
-            </a:r>
-            <a:endParaRPr lang="pt-BR" dirty="0" smtClean="0"/>
-          </a:p>
-        </p:txBody>
-      </p:sp>
+              <a:rPr lang="pt-BR" dirty="0" smtClean="0"/>
+              <a:t>Competição RoboCup @Home</a:t>
+            </a:r>
+            <a:endParaRPr lang="pt-BR" dirty="0"/>
+          </a:p>
+        </p:txBody>
+      </p:sp>
+      <p:pic>
+        <p:nvPicPr>
+          <p:cNvPr id="2050" name="Picture 2" descr="http://www.ok-produkt.cz/Files/560_m1.jpg"/>
+          <p:cNvPicPr>
+            <a:picLocks noChangeAspect="1" noChangeArrowheads="1"/>
+          </p:cNvPicPr>
+          <p:nvPr/>
+        </p:nvPicPr>
+        <p:blipFill>
+          <a:blip r:embed="rId2" cstate="print">
+            <a:extLst>
+              <a:ext uri="{28A0092B-C50C-407E-A947-70E740481C1C}">
+                <a14:useLocalDpi xmlns:a14="http://schemas.microsoft.com/office/drawing/2010/main" val="0"/>
+              </a:ext>
+            </a:extLst>
+          </a:blip>
+          <a:srcRect/>
+          <a:stretch>
+            <a:fillRect/>
+          </a:stretch>
+        </p:blipFill>
+        <p:spPr bwMode="auto">
+          <a:xfrm>
+            <a:off x="611560" y="3898412"/>
+            <a:ext cx="3307054" cy="2511524"/>
+          </a:xfrm>
+          <a:prstGeom prst="rect">
+            <a:avLst/>
+          </a:prstGeom>
+          <a:noFill/>
+          <a:extLst>
+            <a:ext uri="{909E8E84-426E-40DD-AFC4-6F175D3DCCD1}">
+              <a14:hiddenFill xmlns:a14="http://schemas.microsoft.com/office/drawing/2010/main">
+                <a:solidFill>
+                  <a:srgbClr val="FFFFFF"/>
+                </a:solidFill>
+              </a14:hiddenFill>
+            </a:ext>
+          </a:extLst>
+        </p:spPr>
+      </p:pic>
+      <p:pic>
+        <p:nvPicPr>
+          <p:cNvPr id="2052" name="Picture 4" descr="http://whatsnext.nuance.com/wp-content/uploads/Team-RoCKIn-robot-lisa.jpg"/>
+          <p:cNvPicPr>
+            <a:picLocks noChangeAspect="1" noChangeArrowheads="1"/>
+          </p:cNvPicPr>
+          <p:nvPr/>
+        </p:nvPicPr>
+        <p:blipFill>
+          <a:blip r:embed="rId3">
+            <a:extLst>
+              <a:ext uri="{28A0092B-C50C-407E-A947-70E740481C1C}">
+                <a14:useLocalDpi xmlns:a14="http://schemas.microsoft.com/office/drawing/2010/main" val="0"/>
+              </a:ext>
+            </a:extLst>
+          </a:blip>
+          <a:srcRect/>
+          <a:stretch>
+            <a:fillRect/>
+          </a:stretch>
+        </p:blipFill>
+        <p:spPr bwMode="auto">
+          <a:xfrm>
+            <a:off x="5494972" y="3853105"/>
+            <a:ext cx="3469516" cy="2602137"/>
+          </a:xfrm>
+          <a:prstGeom prst="rect">
+            <a:avLst/>
+          </a:prstGeom>
+          <a:noFill/>
+          <a:extLst>
+            <a:ext uri="{909E8E84-426E-40DD-AFC4-6F175D3DCCD1}">
+              <a14:hiddenFill xmlns:a14="http://schemas.microsoft.com/office/drawing/2010/main">
+                <a:solidFill>
+                  <a:srgbClr val="FFFFFF"/>
+                </a:solidFill>
+              </a14:hiddenFill>
+            </a:ext>
+          </a:extLst>
+        </p:spPr>
+      </p:pic>
     </p:spTree>
     <p:extLst>
       <p:ext uri="{BB962C8B-B14F-4D97-AF65-F5344CB8AC3E}">
-        <p14:creationId xmlns:p14="http://schemas.microsoft.com/office/powerpoint/2010/main" val="649753901"/>
+        <p14:creationId xmlns:p14="http://schemas.microsoft.com/office/powerpoint/2010/main" val="3735369947"/>
       </p:ext>
     </p:extLst>
   </p:cSld>
@@ -4741,7 +4878,7 @@
           <a:p>
             <a:r>
               <a:rPr lang="pt-BR" dirty="0" smtClean="0"/>
-              <a:t>Conclusão</a:t>
+              <a:t>Warehouses</a:t>
             </a:r>
             <a:endParaRPr lang="pt-BR" dirty="0"/>
           </a:p>
@@ -4757,686 +4894,53 @@
             <p:ph sz="quarter" idx="1"/>
           </p:nvPr>
         </p:nvSpPr>
-        <p:spPr/>
-        <p:txBody>
-          <a:bodyPr/>
-          <a:lstStyle/>
-          <a:p>
-            <a:r>
-              <a:rPr lang="pt-BR" dirty="0" smtClean="0"/>
-              <a:t>Já existem muitas aplicações envolvendo robótica e IoT</a:t>
-            </a:r>
-          </a:p>
-          <a:p>
-            <a:r>
-              <a:rPr lang="pt-BR" dirty="0" smtClean="0"/>
-              <a:t>Torna possíveis robôs muito mais inteligentes</a:t>
-            </a:r>
-          </a:p>
-          <a:p>
-            <a:r>
-              <a:rPr lang="pt-BR" dirty="0" smtClean="0"/>
-              <a:t>Bastante interesse acadêmico e da indústria</a:t>
-            </a:r>
-          </a:p>
-          <a:p>
-            <a:r>
-              <a:rPr lang="pt-BR" dirty="0" smtClean="0"/>
-              <a:t>A tendência é que haja um crescimento muito grande</a:t>
+        <p:spPr>
+          <a:xfrm>
+            <a:off x="457200" y="1219200"/>
+            <a:ext cx="8229600" cy="3217912"/>
+          </a:xfrm>
+        </p:spPr>
+        <p:txBody>
+          <a:bodyPr>
+            <a:normAutofit fontScale="92500" lnSpcReduction="10000"/>
+          </a:bodyPr>
+          <a:lstStyle/>
+          <a:p>
+            <a:r>
+              <a:rPr lang="pt-BR" dirty="0" smtClean="0"/>
+              <a:t>Robôs já são amplamente utilizados</a:t>
+            </a:r>
+          </a:p>
+          <a:p>
+            <a:r>
+              <a:rPr lang="pt-BR" dirty="0" smtClean="0"/>
+              <a:t>Amazon adquiriu a Kiva em 2012 por US$775 milhões </a:t>
             </a:r>
           </a:p>
           <a:p>
             <a:pPr lvl="1"/>
             <a:r>
               <a:rPr lang="pt-BR" dirty="0" smtClean="0"/>
-              <a:t>Conforme os custos de IoT caem</a:t>
+              <a:t>Mudou o nome para Amazon Robotics e deixou de atender todos os demais clientes – GAP,  Walgreens, Office Depot e muitos outros</a:t>
             </a:r>
           </a:p>
           <a:p>
             <a:pPr lvl="1"/>
             <a:r>
               <a:rPr lang="pt-BR" dirty="0" smtClean="0"/>
-              <a:t>Com o amadurecimento da robótica</a:t>
-            </a:r>
-            <a:endParaRPr lang="pt-BR" dirty="0"/>
-          </a:p>
-        </p:txBody>
-      </p:sp>
-    </p:spTree>
-    <p:extLst>
-      <p:ext uri="{BB962C8B-B14F-4D97-AF65-F5344CB8AC3E}">
-        <p14:creationId xmlns:p14="http://schemas.microsoft.com/office/powerpoint/2010/main" val="3527821407"/>
-      </p:ext>
-    </p:extLst>
-  </p:cSld>
-  <p:clrMapOvr>
-    <a:masterClrMapping/>
-  </p:clrMapOvr>
-</p:sld>
-</file>
-
-<file path=ppt/slides/slide16.xml><?xml version="1.0" encoding="utf-8"?>
-<p:sld xmlns:a="http://schemas.openxmlformats.org/drawingml/2006/main" xmlns:r="http://schemas.openxmlformats.org/officeDocument/2006/relationships" xmlns:p="http://schemas.openxmlformats.org/presentationml/2006/main">
-  <p:cSld>
-    <p:spTree>
-      <p:nvGrpSpPr>
-        <p:cNvPr id="1" name=""/>
-        <p:cNvGrpSpPr/>
-        <p:nvPr/>
-      </p:nvGrpSpPr>
-      <p:grpSpPr>
-        <a:xfrm>
-          <a:off x="0" y="0"/>
-          <a:ext cx="0" cy="0"/>
-          <a:chOff x="0" y="0"/>
-          <a:chExt cx="0" cy="0"/>
-        </a:xfrm>
-      </p:grpSpPr>
-      <p:sp>
-        <p:nvSpPr>
-          <p:cNvPr id="2" name="Title 1"/>
-          <p:cNvSpPr>
-            <a:spLocks noGrp="1"/>
-          </p:cNvSpPr>
-          <p:nvPr>
-            <p:ph type="title"/>
-          </p:nvPr>
-        </p:nvSpPr>
-        <p:spPr/>
-        <p:txBody>
-          <a:bodyPr/>
-          <a:lstStyle/>
-          <a:p>
-            <a:r>
-              <a:rPr lang="pt-BR" dirty="0" smtClean="0"/>
-              <a:t>Dúvidas</a:t>
-            </a:r>
-            <a:endParaRPr lang="pt-BR" dirty="0"/>
-          </a:p>
-        </p:txBody>
-      </p:sp>
-      <p:sp>
-        <p:nvSpPr>
-          <p:cNvPr id="3" name="Content Placeholder 2"/>
-          <p:cNvSpPr>
-            <a:spLocks noGrp="1"/>
-          </p:cNvSpPr>
-          <p:nvPr>
-            <p:ph sz="quarter" idx="1"/>
-          </p:nvPr>
-        </p:nvSpPr>
-        <p:spPr/>
-        <p:txBody>
-          <a:bodyPr/>
-          <a:lstStyle/>
-          <a:p>
-            <a:endParaRPr lang="pt-BR"/>
-          </a:p>
-        </p:txBody>
-      </p:sp>
-    </p:spTree>
-    <p:extLst>
-      <p:ext uri="{BB962C8B-B14F-4D97-AF65-F5344CB8AC3E}">
-        <p14:creationId xmlns:p14="http://schemas.microsoft.com/office/powerpoint/2010/main" val="3602084392"/>
-      </p:ext>
-    </p:extLst>
-  </p:cSld>
-  <p:clrMapOvr>
-    <a:masterClrMapping/>
-  </p:clrMapOvr>
-</p:sld>
-</file>
-
-<file path=ppt/slides/slide17.xml><?xml version="1.0" encoding="utf-8"?>
-<p:sld xmlns:a="http://schemas.openxmlformats.org/drawingml/2006/main" xmlns:r="http://schemas.openxmlformats.org/officeDocument/2006/relationships" xmlns:p="http://schemas.openxmlformats.org/presentationml/2006/main">
-  <p:cSld>
-    <p:spTree>
-      <p:nvGrpSpPr>
-        <p:cNvPr id="1" name=""/>
-        <p:cNvGrpSpPr/>
-        <p:nvPr/>
-      </p:nvGrpSpPr>
-      <p:grpSpPr>
-        <a:xfrm>
-          <a:off x="0" y="0"/>
-          <a:ext cx="0" cy="0"/>
-          <a:chOff x="0" y="0"/>
-          <a:chExt cx="0" cy="0"/>
-        </a:xfrm>
-      </p:grpSpPr>
-      <p:sp>
-        <p:nvSpPr>
-          <p:cNvPr id="2" name="Title 1"/>
-          <p:cNvSpPr>
-            <a:spLocks noGrp="1"/>
-          </p:cNvSpPr>
-          <p:nvPr>
-            <p:ph type="title"/>
-          </p:nvPr>
-        </p:nvSpPr>
-        <p:spPr/>
-        <p:txBody>
-          <a:bodyPr/>
-          <a:lstStyle/>
-          <a:p>
-            <a:r>
-              <a:rPr lang="pt-BR" dirty="0" smtClean="0"/>
-              <a:t>Referências</a:t>
-            </a:r>
-            <a:endParaRPr lang="pt-BR" dirty="0"/>
-          </a:p>
-        </p:txBody>
-      </p:sp>
-      <p:sp>
-        <p:nvSpPr>
-          <p:cNvPr id="3" name="Content Placeholder 2"/>
-          <p:cNvSpPr>
-            <a:spLocks noGrp="1"/>
-          </p:cNvSpPr>
-          <p:nvPr>
-            <p:ph sz="quarter" idx="1"/>
-          </p:nvPr>
-        </p:nvSpPr>
-        <p:spPr/>
-        <p:txBody>
-          <a:bodyPr/>
-          <a:lstStyle/>
-          <a:p>
-            <a:endParaRPr lang="pt-BR"/>
-          </a:p>
-        </p:txBody>
-      </p:sp>
-    </p:spTree>
-    <p:extLst>
-      <p:ext uri="{BB962C8B-B14F-4D97-AF65-F5344CB8AC3E}">
-        <p14:creationId xmlns:p14="http://schemas.microsoft.com/office/powerpoint/2010/main" val="964487792"/>
-      </p:ext>
-    </p:extLst>
-  </p:cSld>
-  <p:clrMapOvr>
-    <a:masterClrMapping/>
-  </p:clrMapOvr>
-</p:sld>
-</file>
-
-<file path=ppt/slides/slide2.xml><?xml version="1.0" encoding="utf-8"?>
-<p:sld xmlns:a="http://schemas.openxmlformats.org/drawingml/2006/main" xmlns:r="http://schemas.openxmlformats.org/officeDocument/2006/relationships" xmlns:p="http://schemas.openxmlformats.org/presentationml/2006/main">
-  <p:cSld>
-    <p:spTree>
-      <p:nvGrpSpPr>
-        <p:cNvPr id="1" name=""/>
-        <p:cNvGrpSpPr/>
-        <p:nvPr/>
-      </p:nvGrpSpPr>
-      <p:grpSpPr>
-        <a:xfrm>
-          <a:off x="0" y="0"/>
-          <a:ext cx="0" cy="0"/>
-          <a:chOff x="0" y="0"/>
-          <a:chExt cx="0" cy="0"/>
-        </a:xfrm>
-      </p:grpSpPr>
-      <p:sp>
-        <p:nvSpPr>
-          <p:cNvPr id="2" name="Title 1"/>
-          <p:cNvSpPr>
-            <a:spLocks noGrp="1"/>
-          </p:cNvSpPr>
-          <p:nvPr>
-            <p:ph type="title"/>
-          </p:nvPr>
-        </p:nvSpPr>
-        <p:spPr/>
-        <p:txBody>
-          <a:bodyPr/>
-          <a:lstStyle/>
-          <a:p>
-            <a:r>
-              <a:rPr lang="pt-BR" dirty="0" smtClean="0"/>
-              <a:t>Agenda</a:t>
-            </a:r>
-            <a:endParaRPr lang="pt-BR" dirty="0"/>
-          </a:p>
-        </p:txBody>
-      </p:sp>
-      <p:sp>
-        <p:nvSpPr>
-          <p:cNvPr id="3" name="Content Placeholder 2"/>
-          <p:cNvSpPr>
-            <a:spLocks noGrp="1"/>
-          </p:cNvSpPr>
-          <p:nvPr>
-            <p:ph sz="quarter" idx="1"/>
-          </p:nvPr>
-        </p:nvSpPr>
-        <p:spPr/>
-        <p:txBody>
-          <a:bodyPr>
-            <a:normAutofit/>
-          </a:bodyPr>
-          <a:lstStyle/>
-          <a:p>
-            <a:r>
-              <a:rPr lang="pt-BR" dirty="0" smtClean="0"/>
-              <a:t>Robótica – Introdução</a:t>
-            </a:r>
-          </a:p>
-          <a:p>
-            <a:pPr lvl="1"/>
-            <a:r>
-              <a:rPr lang="pt-BR" dirty="0" smtClean="0"/>
-              <a:t>Tipos de robôs</a:t>
-            </a:r>
-          </a:p>
-          <a:p>
-            <a:pPr lvl="1"/>
-            <a:r>
-              <a:rPr lang="pt-BR" dirty="0" smtClean="0"/>
-              <a:t>Robótica em Nuvem</a:t>
-            </a:r>
-            <a:endParaRPr lang="pt-BR" dirty="0" smtClean="0"/>
-          </a:p>
-          <a:p>
-            <a:r>
-              <a:rPr lang="pt-BR" dirty="0" smtClean="0"/>
-              <a:t>Semelhanças </a:t>
-            </a:r>
-            <a:r>
-              <a:rPr lang="pt-BR" dirty="0" smtClean="0"/>
-              <a:t>e convergência com IoT</a:t>
-            </a:r>
-          </a:p>
-          <a:p>
-            <a:r>
-              <a:rPr lang="pt-BR" dirty="0" smtClean="0"/>
-              <a:t>Aplicações em diferentes segmentos</a:t>
-            </a:r>
-          </a:p>
-          <a:p>
-            <a:pPr lvl="1"/>
-            <a:r>
-              <a:rPr lang="pt-BR" dirty="0" smtClean="0"/>
-              <a:t>Robôs Domésticos</a:t>
-            </a:r>
-          </a:p>
-          <a:p>
-            <a:pPr lvl="1"/>
-            <a:r>
-              <a:rPr lang="pt-BR" dirty="0" smtClean="0"/>
-              <a:t>Warehouses</a:t>
-            </a:r>
-          </a:p>
-          <a:p>
-            <a:pPr lvl="1"/>
-            <a:r>
-              <a:rPr lang="pt-BR" dirty="0" smtClean="0"/>
-              <a:t>Outros</a:t>
-            </a:r>
-            <a:endParaRPr lang="pt-BR" dirty="0"/>
-          </a:p>
-        </p:txBody>
-      </p:sp>
-    </p:spTree>
-    <p:extLst>
-      <p:ext uri="{BB962C8B-B14F-4D97-AF65-F5344CB8AC3E}">
-        <p14:creationId xmlns:p14="http://schemas.microsoft.com/office/powerpoint/2010/main" val="3593250634"/>
-      </p:ext>
-    </p:extLst>
-  </p:cSld>
-  <p:clrMapOvr>
-    <a:masterClrMapping/>
-  </p:clrMapOvr>
-</p:sld>
-</file>
-
-<file path=ppt/slides/slide3.xml><?xml version="1.0" encoding="utf-8"?>
-<p:sld xmlns:a="http://schemas.openxmlformats.org/drawingml/2006/main" xmlns:r="http://schemas.openxmlformats.org/officeDocument/2006/relationships" xmlns:p="http://schemas.openxmlformats.org/presentationml/2006/main">
-  <p:cSld>
-    <p:spTree>
-      <p:nvGrpSpPr>
-        <p:cNvPr id="1" name=""/>
-        <p:cNvGrpSpPr/>
-        <p:nvPr/>
-      </p:nvGrpSpPr>
-      <p:grpSpPr>
-        <a:xfrm>
-          <a:off x="0" y="0"/>
-          <a:ext cx="0" cy="0"/>
-          <a:chOff x="0" y="0"/>
-          <a:chExt cx="0" cy="0"/>
-        </a:xfrm>
-      </p:grpSpPr>
-      <p:sp>
-        <p:nvSpPr>
-          <p:cNvPr id="2" name="Title 1"/>
-          <p:cNvSpPr>
-            <a:spLocks noGrp="1"/>
-          </p:cNvSpPr>
-          <p:nvPr>
-            <p:ph type="title"/>
-          </p:nvPr>
-        </p:nvSpPr>
-        <p:spPr/>
-        <p:txBody>
-          <a:bodyPr/>
-          <a:lstStyle/>
-          <a:p>
-            <a:r>
-              <a:rPr lang="pt-BR" dirty="0" smtClean="0"/>
-              <a:t>Robótica</a:t>
-            </a:r>
-            <a:endParaRPr lang="pt-BR" dirty="0"/>
-          </a:p>
-        </p:txBody>
-      </p:sp>
-      <p:sp>
-        <p:nvSpPr>
-          <p:cNvPr id="3" name="Content Placeholder 2"/>
-          <p:cNvSpPr>
-            <a:spLocks noGrp="1"/>
-          </p:cNvSpPr>
-          <p:nvPr>
-            <p:ph sz="quarter" idx="1"/>
-          </p:nvPr>
-        </p:nvSpPr>
-        <p:spPr>
-          <a:xfrm>
-            <a:off x="457200" y="1219200"/>
-            <a:ext cx="8229600" cy="5162128"/>
-          </a:xfrm>
-        </p:spPr>
-        <p:txBody>
-          <a:bodyPr>
-            <a:normAutofit lnSpcReduction="10000"/>
-          </a:bodyPr>
-          <a:lstStyle/>
-          <a:p>
-            <a:r>
-              <a:rPr lang="pt-BR" dirty="0" smtClean="0"/>
-              <a:t>Robôs: Realizam tarefas para os seres humanos</a:t>
-            </a:r>
-          </a:p>
-          <a:p>
-            <a:pPr lvl="1"/>
-            <a:r>
-              <a:rPr lang="pt-BR" dirty="0" smtClean="0"/>
-              <a:t>Perigosas, repetitivas, distantes, ...</a:t>
-            </a:r>
-            <a:endParaRPr lang="pt-BR" dirty="0" smtClean="0"/>
-          </a:p>
-          <a:p>
-            <a:pPr lvl="1"/>
-            <a:r>
-              <a:rPr lang="pt-BR" dirty="0" smtClean="0"/>
-              <a:t>Operados de maneira autônoma ou </a:t>
-            </a:r>
-            <a:r>
-              <a:rPr lang="pt-BR" dirty="0" smtClean="0"/>
-              <a:t>semi-autônoma</a:t>
-            </a:r>
-          </a:p>
-          <a:p>
-            <a:pPr lvl="1"/>
-            <a:r>
-              <a:rPr lang="pt-BR" dirty="0" smtClean="0"/>
-              <a:t>Se comunicam com seres humanos ou outros robôs</a:t>
-            </a:r>
-          </a:p>
-          <a:p>
-            <a:pPr lvl="1"/>
-            <a:r>
-              <a:rPr lang="pt-BR" dirty="0" smtClean="0"/>
-              <a:t>Interagem com o ambiente por meio de sensores (sonar, </a:t>
-            </a:r>
-            <a:r>
-              <a:rPr lang="pt-BR" dirty="0"/>
-              <a:t>laser, </a:t>
-            </a:r>
-            <a:r>
-              <a:rPr lang="pt-BR" dirty="0" smtClean="0"/>
-              <a:t>infravermelho, </a:t>
-            </a:r>
-            <a:r>
-              <a:rPr lang="pt-BR" dirty="0" smtClean="0"/>
-              <a:t>câmeras, bumpers) e atuadores</a:t>
-            </a:r>
-            <a:endParaRPr lang="pt-BR" dirty="0" smtClean="0"/>
-          </a:p>
-          <a:p>
-            <a:r>
-              <a:rPr lang="pt-BR" dirty="0" smtClean="0"/>
-              <a:t>Principais Aplicações</a:t>
-            </a:r>
-          </a:p>
-          <a:p>
-            <a:pPr lvl="1"/>
-            <a:r>
-              <a:rPr lang="pt-BR" dirty="0" smtClean="0"/>
-              <a:t>Indústria</a:t>
-            </a:r>
-          </a:p>
-          <a:p>
-            <a:pPr lvl="1"/>
-            <a:r>
-              <a:rPr lang="pt-BR" dirty="0" smtClean="0"/>
-              <a:t>Tarefas Domésticas</a:t>
-            </a:r>
-          </a:p>
-          <a:p>
-            <a:pPr lvl="1"/>
-            <a:r>
-              <a:rPr lang="pt-BR" dirty="0" smtClean="0"/>
-              <a:t>Exploração</a:t>
-            </a:r>
-          </a:p>
-          <a:p>
-            <a:pPr lvl="1"/>
-            <a:r>
-              <a:rPr lang="pt-BR" dirty="0" smtClean="0"/>
-              <a:t>Missões em Ambientes Perigosos</a:t>
-            </a:r>
-          </a:p>
-          <a:p>
-            <a:pPr lvl="1"/>
-            <a:r>
-              <a:rPr lang="pt-BR" dirty="0" smtClean="0"/>
-              <a:t>Missões Espaciais</a:t>
-            </a:r>
-          </a:p>
-          <a:p>
-            <a:pPr lvl="1"/>
-            <a:r>
-              <a:rPr lang="pt-BR" dirty="0" smtClean="0"/>
-              <a:t>Fins Educacionais</a:t>
-            </a:r>
-          </a:p>
-        </p:txBody>
-      </p:sp>
-    </p:spTree>
-    <p:extLst>
-      <p:ext uri="{BB962C8B-B14F-4D97-AF65-F5344CB8AC3E}">
-        <p14:creationId xmlns:p14="http://schemas.microsoft.com/office/powerpoint/2010/main" val="156060572"/>
-      </p:ext>
-    </p:extLst>
-  </p:cSld>
-  <p:clrMapOvr>
-    <a:masterClrMapping/>
-  </p:clrMapOvr>
-</p:sld>
-</file>
-
-<file path=ppt/slides/slide4.xml><?xml version="1.0" encoding="utf-8"?>
-<p:sld xmlns:a="http://schemas.openxmlformats.org/drawingml/2006/main" xmlns:r="http://schemas.openxmlformats.org/officeDocument/2006/relationships" xmlns:p="http://schemas.openxmlformats.org/presentationml/2006/main">
-  <p:cSld>
-    <p:spTree>
-      <p:nvGrpSpPr>
-        <p:cNvPr id="1" name=""/>
-        <p:cNvGrpSpPr/>
-        <p:nvPr/>
-      </p:nvGrpSpPr>
-      <p:grpSpPr>
-        <a:xfrm>
-          <a:off x="0" y="0"/>
-          <a:ext cx="0" cy="0"/>
-          <a:chOff x="0" y="0"/>
-          <a:chExt cx="0" cy="0"/>
-        </a:xfrm>
-      </p:grpSpPr>
-      <p:sp>
-        <p:nvSpPr>
-          <p:cNvPr id="2" name="Title 1"/>
-          <p:cNvSpPr>
-            <a:spLocks noGrp="1"/>
-          </p:cNvSpPr>
-          <p:nvPr>
-            <p:ph type="title"/>
-          </p:nvPr>
-        </p:nvSpPr>
-        <p:spPr/>
-        <p:txBody>
-          <a:bodyPr/>
-          <a:lstStyle/>
-          <a:p>
-            <a:r>
-              <a:rPr lang="pt-BR" dirty="0" smtClean="0"/>
-              <a:t>Tipos de Robôs</a:t>
-            </a:r>
-            <a:endParaRPr lang="pt-BR" dirty="0"/>
-          </a:p>
-        </p:txBody>
-      </p:sp>
-      <p:sp>
-        <p:nvSpPr>
-          <p:cNvPr id="3" name="Content Placeholder 2"/>
-          <p:cNvSpPr>
-            <a:spLocks noGrp="1"/>
-          </p:cNvSpPr>
-          <p:nvPr>
-            <p:ph sz="quarter" idx="1"/>
-          </p:nvPr>
-        </p:nvSpPr>
-        <p:spPr/>
-        <p:txBody>
-          <a:bodyPr/>
-          <a:lstStyle/>
-          <a:p>
-            <a:r>
-              <a:rPr lang="pt-BR" dirty="0" smtClean="0"/>
-              <a:t>Robôs Móveis</a:t>
-            </a:r>
-          </a:p>
-          <a:p>
-            <a:pPr lvl="1"/>
-            <a:r>
-              <a:rPr lang="pt-BR" dirty="0" smtClean="0"/>
-              <a:t>Terrestres</a:t>
-            </a:r>
-          </a:p>
-          <a:p>
-            <a:pPr lvl="2"/>
-            <a:r>
-              <a:rPr lang="pt-BR" dirty="0" smtClean="0"/>
-              <a:t>Rodas ou esteiras</a:t>
-            </a:r>
-            <a:endParaRPr lang="pt-BR" dirty="0" smtClean="0"/>
-          </a:p>
-          <a:p>
-            <a:pPr lvl="2"/>
-            <a:r>
-              <a:rPr lang="pt-BR" dirty="0" smtClean="0"/>
-              <a:t>Pernas</a:t>
-            </a:r>
-          </a:p>
-          <a:p>
-            <a:pPr lvl="2"/>
-            <a:r>
-              <a:rPr lang="pt-BR" dirty="0" smtClean="0"/>
-              <a:t>Híbridos</a:t>
-            </a:r>
-            <a:endParaRPr lang="pt-BR" dirty="0" smtClean="0"/>
-          </a:p>
-          <a:p>
-            <a:pPr lvl="1"/>
-            <a:r>
-              <a:rPr lang="pt-BR" dirty="0" smtClean="0"/>
-              <a:t>Humanóides</a:t>
-            </a:r>
-          </a:p>
-          <a:p>
-            <a:pPr lvl="1"/>
-            <a:r>
-              <a:rPr lang="pt-BR" dirty="0" smtClean="0"/>
-              <a:t>Aéreos</a:t>
-            </a:r>
-          </a:p>
-          <a:p>
-            <a:pPr lvl="1"/>
-            <a:r>
-              <a:rPr lang="pt-BR" dirty="0" smtClean="0"/>
-              <a:t>Aquáticos</a:t>
-            </a:r>
-          </a:p>
-          <a:p>
-            <a:pPr lvl="1"/>
-            <a:r>
-              <a:rPr lang="pt-BR" dirty="0" smtClean="0"/>
-              <a:t>Modulares</a:t>
-            </a:r>
-          </a:p>
-          <a:p>
-            <a:pPr lvl="1"/>
-            <a:endParaRPr lang="pt-BR" dirty="0"/>
-          </a:p>
-        </p:txBody>
-      </p:sp>
-    </p:spTree>
-    <p:extLst>
-      <p:ext uri="{BB962C8B-B14F-4D97-AF65-F5344CB8AC3E}">
-        <p14:creationId xmlns:p14="http://schemas.microsoft.com/office/powerpoint/2010/main" val="2766568419"/>
-      </p:ext>
-    </p:extLst>
-  </p:cSld>
-  <p:clrMapOvr>
-    <a:masterClrMapping/>
-  </p:clrMapOvr>
-</p:sld>
-</file>
-
-<file path=ppt/slides/slide5.xml><?xml version="1.0" encoding="utf-8"?>
-<p:sld xmlns:a="http://schemas.openxmlformats.org/drawingml/2006/main" xmlns:r="http://schemas.openxmlformats.org/officeDocument/2006/relationships" xmlns:p="http://schemas.openxmlformats.org/presentationml/2006/main">
-  <p:cSld>
-    <p:spTree>
-      <p:nvGrpSpPr>
-        <p:cNvPr id="1" name=""/>
-        <p:cNvGrpSpPr/>
-        <p:nvPr/>
-      </p:nvGrpSpPr>
-      <p:grpSpPr>
-        <a:xfrm>
-          <a:off x="0" y="0"/>
-          <a:ext cx="0" cy="0"/>
-          <a:chOff x="0" y="0"/>
-          <a:chExt cx="0" cy="0"/>
-        </a:xfrm>
-      </p:grpSpPr>
-      <p:sp>
-        <p:nvSpPr>
-          <p:cNvPr id="2" name="Title 1"/>
-          <p:cNvSpPr>
-            <a:spLocks noGrp="1"/>
-          </p:cNvSpPr>
-          <p:nvPr>
-            <p:ph type="title"/>
-          </p:nvPr>
-        </p:nvSpPr>
-        <p:spPr/>
-        <p:txBody>
-          <a:bodyPr/>
-          <a:lstStyle/>
-          <a:p>
-            <a:r>
-              <a:rPr lang="pt-BR" dirty="0" smtClean="0"/>
-              <a:t>Tipos de Robôs</a:t>
+              <a:t>Mais de 30 mil robôs em seus depósitos</a:t>
+            </a:r>
+          </a:p>
+          <a:p>
+            <a:r>
+              <a:rPr lang="pt-BR" dirty="0" smtClean="0"/>
+              <a:t>Ambientes com sensores, produtos e pallets com tags RFID – auxiliam o robô na tarefa de localizar e transportar produtos</a:t>
+            </a:r>
+          </a:p>
+          <a:p>
+            <a:r>
+              <a:rPr lang="pt-BR" dirty="0" smtClean="0"/>
+              <a:t>Robô pode ser acionado assim que um pedido online é feito</a:t>
             </a:r>
             <a:endParaRPr lang="pt-BR" dirty="0"/>
           </a:p>
@@ -5444,7 +4948,7 @@
       </p:sp>
       <p:pic>
         <p:nvPicPr>
-          <p:cNvPr id="5" name="Picture 4" descr="https://i.ytimg.com/vi/4oSavAHf0dg/hqdefault.jpg"/>
+          <p:cNvPr id="4098" name="Picture 2"/>
           <p:cNvPicPr>
             <a:picLocks noChangeAspect="1" noChangeArrowheads="1"/>
           </p:cNvPicPr>
@@ -5465,369 +4969,8 @@
         </p:blipFill>
         <p:spPr bwMode="auto">
           <a:xfrm>
-            <a:off x="6156176" y="4232418"/>
-            <a:ext cx="2880318" cy="2160239"/>
-          </a:xfrm>
-          <a:prstGeom prst="rect">
-            <a:avLst/>
-          </a:prstGeom>
-          <a:noFill/>
-          <a:extLst>
-            <a:ext uri="{909E8E84-426E-40DD-AFC4-6F175D3DCCD1}">
-              <a14:hiddenFill xmlns:a14="http://schemas.microsoft.com/office/drawing/2010/main">
-                <a:solidFill>
-                  <a:srgbClr val="FFFFFF"/>
-                </a:solidFill>
-              </a14:hiddenFill>
-            </a:ext>
-          </a:extLst>
-        </p:spPr>
-      </p:pic>
-      <p:pic>
-        <p:nvPicPr>
-          <p:cNvPr id="6" name="Picture 6" descr="http://www.rutgersprep.org/kendall/7thgrade/cycleA_2008_09/zi/AQUAreading_pic.jpg"/>
-          <p:cNvPicPr>
-            <a:picLocks noChangeAspect="1" noChangeArrowheads="1"/>
-          </p:cNvPicPr>
-          <p:nvPr/>
-        </p:nvPicPr>
-        <p:blipFill>
-          <a:blip r:embed="rId3">
-            <a:extLst>
-              <a:ext uri="{28A0092B-C50C-407E-A947-70E740481C1C}">
-                <a14:useLocalDpi xmlns:a14="http://schemas.microsoft.com/office/drawing/2010/main" val="0"/>
-              </a:ext>
-            </a:extLst>
-          </a:blip>
-          <a:srcRect/>
-          <a:stretch>
-            <a:fillRect/>
-          </a:stretch>
-        </p:blipFill>
-        <p:spPr bwMode="auto">
-          <a:xfrm>
-            <a:off x="290629" y="4232418"/>
-            <a:ext cx="2865213" cy="2148910"/>
-          </a:xfrm>
-          <a:prstGeom prst="rect">
-            <a:avLst/>
-          </a:prstGeom>
-          <a:noFill/>
-          <a:extLst>
-            <a:ext uri="{909E8E84-426E-40DD-AFC4-6F175D3DCCD1}">
-              <a14:hiddenFill xmlns:a14="http://schemas.microsoft.com/office/drawing/2010/main">
-                <a:solidFill>
-                  <a:srgbClr val="FFFFFF"/>
-                </a:solidFill>
-              </a14:hiddenFill>
-            </a:ext>
-          </a:extLst>
-        </p:spPr>
-      </p:pic>
-      <p:pic>
-        <p:nvPicPr>
-          <p:cNvPr id="1026" name="Picture 2" descr="Resultado de imagem para humanoid robot"/>
-          <p:cNvPicPr>
-            <a:picLocks noChangeAspect="1" noChangeArrowheads="1"/>
-          </p:cNvPicPr>
-          <p:nvPr/>
-        </p:nvPicPr>
-        <p:blipFill>
-          <a:blip r:embed="rId4">
-            <a:extLst>
-              <a:ext uri="{28A0092B-C50C-407E-A947-70E740481C1C}">
-                <a14:useLocalDpi xmlns:a14="http://schemas.microsoft.com/office/drawing/2010/main" val="0"/>
-              </a:ext>
-            </a:extLst>
-          </a:blip>
-          <a:srcRect/>
-          <a:stretch>
-            <a:fillRect/>
-          </a:stretch>
-        </p:blipFill>
-        <p:spPr bwMode="auto">
-          <a:xfrm>
-            <a:off x="6142143" y="1196752"/>
-            <a:ext cx="2750337" cy="2750337"/>
-          </a:xfrm>
-          <a:prstGeom prst="rect">
-            <a:avLst/>
-          </a:prstGeom>
-          <a:noFill/>
-          <a:extLst>
-            <a:ext uri="{909E8E84-426E-40DD-AFC4-6F175D3DCCD1}">
-              <a14:hiddenFill xmlns:a14="http://schemas.microsoft.com/office/drawing/2010/main">
-                <a:solidFill>
-                  <a:srgbClr val="FFFFFF"/>
-                </a:solidFill>
-              </a14:hiddenFill>
-            </a:ext>
-          </a:extLst>
-        </p:spPr>
-      </p:pic>
-      <p:sp>
-        <p:nvSpPr>
-          <p:cNvPr id="7" name="AutoShape 4" descr="Resultado de imagem para flying robot"/>
-          <p:cNvSpPr>
-            <a:spLocks noChangeAspect="1" noChangeArrowheads="1"/>
-          </p:cNvSpPr>
-          <p:nvPr/>
-        </p:nvSpPr>
-        <p:spPr bwMode="auto">
-          <a:xfrm>
-            <a:off x="155575" y="-144463"/>
-            <a:ext cx="304800" cy="304801"/>
-          </a:xfrm>
-          <a:prstGeom prst="rect">
-            <a:avLst/>
-          </a:prstGeom>
-          <a:noFill/>
-          <a:extLst>
-            <a:ext uri="{909E8E84-426E-40DD-AFC4-6F175D3DCCD1}">
-              <a14:hiddenFill xmlns:a14="http://schemas.microsoft.com/office/drawing/2010/main">
-                <a:solidFill>
-                  <a:srgbClr val="FFFFFF"/>
-                </a:solidFill>
-              </a14:hiddenFill>
-            </a:ext>
-          </a:extLst>
-        </p:spPr>
-        <p:txBody>
-          <a:bodyPr vert="horz" wrap="square" lIns="91440" tIns="45720" rIns="91440" bIns="45720" numCol="1" anchor="t" anchorCtr="0" compatLnSpc="1">
-            <a:prstTxWarp prst="textNoShape">
-              <a:avLst/>
-            </a:prstTxWarp>
-          </a:bodyPr>
-          <a:lstStyle/>
-          <a:p>
-            <a:endParaRPr lang="pt-BR"/>
-          </a:p>
-        </p:txBody>
-      </p:sp>
-      <p:pic>
-        <p:nvPicPr>
-          <p:cNvPr id="1030" name="Picture 6" descr="Resultado de imagem para flying robot"/>
-          <p:cNvPicPr>
-            <a:picLocks noChangeAspect="1" noChangeArrowheads="1"/>
-          </p:cNvPicPr>
-          <p:nvPr/>
-        </p:nvPicPr>
-        <p:blipFill>
-          <a:blip r:embed="rId5">
-            <a:extLst>
-              <a:ext uri="{28A0092B-C50C-407E-A947-70E740481C1C}">
-                <a14:useLocalDpi xmlns:a14="http://schemas.microsoft.com/office/drawing/2010/main" val="0"/>
-              </a:ext>
-            </a:extLst>
-          </a:blip>
-          <a:srcRect/>
-          <a:stretch>
-            <a:fillRect/>
-          </a:stretch>
-        </p:blipFill>
-        <p:spPr bwMode="auto">
-          <a:xfrm>
-            <a:off x="3181350" y="1525886"/>
-            <a:ext cx="2932728" cy="1951598"/>
-          </a:xfrm>
-          <a:prstGeom prst="rect">
-            <a:avLst/>
-          </a:prstGeom>
-          <a:noFill/>
-          <a:extLst>
-            <a:ext uri="{909E8E84-426E-40DD-AFC4-6F175D3DCCD1}">
-              <a14:hiddenFill xmlns:a14="http://schemas.microsoft.com/office/drawing/2010/main">
-                <a:solidFill>
-                  <a:srgbClr val="FFFFFF"/>
-                </a:solidFill>
-              </a14:hiddenFill>
-            </a:ext>
-          </a:extLst>
-        </p:spPr>
-      </p:pic>
-      <p:pic>
-        <p:nvPicPr>
-          <p:cNvPr id="1032" name="Picture 8" descr="Resultado de imagem para extraterrestrial exploration robot"/>
-          <p:cNvPicPr>
-            <a:picLocks noChangeAspect="1" noChangeArrowheads="1"/>
-          </p:cNvPicPr>
-          <p:nvPr/>
-        </p:nvPicPr>
-        <p:blipFill>
-          <a:blip r:embed="rId6">
-            <a:extLst>
-              <a:ext uri="{28A0092B-C50C-407E-A947-70E740481C1C}">
-                <a14:useLocalDpi xmlns:a14="http://schemas.microsoft.com/office/drawing/2010/main" val="0"/>
-              </a:ext>
-            </a:extLst>
-          </a:blip>
-          <a:srcRect/>
-          <a:stretch>
-            <a:fillRect/>
-          </a:stretch>
-        </p:blipFill>
-        <p:spPr bwMode="auto">
-          <a:xfrm>
-            <a:off x="346544" y="1457891"/>
-            <a:ext cx="2809297" cy="2087588"/>
-          </a:xfrm>
-          <a:prstGeom prst="rect">
-            <a:avLst/>
-          </a:prstGeom>
-          <a:noFill/>
-          <a:extLst>
-            <a:ext uri="{909E8E84-426E-40DD-AFC4-6F175D3DCCD1}">
-              <a14:hiddenFill xmlns:a14="http://schemas.microsoft.com/office/drawing/2010/main">
-                <a:solidFill>
-                  <a:srgbClr val="FFFFFF"/>
-                </a:solidFill>
-              </a14:hiddenFill>
-            </a:ext>
-          </a:extLst>
-        </p:spPr>
-      </p:pic>
-      <p:sp>
-        <p:nvSpPr>
-          <p:cNvPr id="8" name="AutoShape 10" descr="Resultado de imagem para p3-dx"/>
-          <p:cNvSpPr>
-            <a:spLocks noChangeAspect="1" noChangeArrowheads="1"/>
-          </p:cNvSpPr>
-          <p:nvPr/>
-        </p:nvSpPr>
-        <p:spPr bwMode="auto">
-          <a:xfrm>
-            <a:off x="307975" y="7937"/>
-            <a:ext cx="304800" cy="304801"/>
-          </a:xfrm>
-          <a:prstGeom prst="rect">
-            <a:avLst/>
-          </a:prstGeom>
-          <a:noFill/>
-          <a:extLst>
-            <a:ext uri="{909E8E84-426E-40DD-AFC4-6F175D3DCCD1}">
-              <a14:hiddenFill xmlns:a14="http://schemas.microsoft.com/office/drawing/2010/main">
-                <a:solidFill>
-                  <a:srgbClr val="FFFFFF"/>
-                </a:solidFill>
-              </a14:hiddenFill>
-            </a:ext>
-          </a:extLst>
-        </p:spPr>
-        <p:txBody>
-          <a:bodyPr vert="horz" wrap="square" lIns="91440" tIns="45720" rIns="91440" bIns="45720" numCol="1" anchor="t" anchorCtr="0" compatLnSpc="1">
-            <a:prstTxWarp prst="textNoShape">
-              <a:avLst/>
-            </a:prstTxWarp>
-          </a:bodyPr>
-          <a:lstStyle/>
-          <a:p>
-            <a:endParaRPr lang="pt-BR"/>
-          </a:p>
-        </p:txBody>
-      </p:sp>
-      <p:sp>
-        <p:nvSpPr>
-          <p:cNvPr id="9" name="AutoShape 12" descr="Resultado de imagem para p3-dx"/>
-          <p:cNvSpPr>
-            <a:spLocks noChangeAspect="1" noChangeArrowheads="1"/>
-          </p:cNvSpPr>
-          <p:nvPr/>
-        </p:nvSpPr>
-        <p:spPr bwMode="auto">
-          <a:xfrm>
-            <a:off x="460375" y="160337"/>
-            <a:ext cx="304800" cy="304801"/>
-          </a:xfrm>
-          <a:prstGeom prst="rect">
-            <a:avLst/>
-          </a:prstGeom>
-          <a:noFill/>
-          <a:extLst>
-            <a:ext uri="{909E8E84-426E-40DD-AFC4-6F175D3DCCD1}">
-              <a14:hiddenFill xmlns:a14="http://schemas.microsoft.com/office/drawing/2010/main">
-                <a:solidFill>
-                  <a:srgbClr val="FFFFFF"/>
-                </a:solidFill>
-              </a14:hiddenFill>
-            </a:ext>
-          </a:extLst>
-        </p:spPr>
-        <p:txBody>
-          <a:bodyPr vert="horz" wrap="square" lIns="91440" tIns="45720" rIns="91440" bIns="45720" numCol="1" anchor="t" anchorCtr="0" compatLnSpc="1">
-            <a:prstTxWarp prst="textNoShape">
-              <a:avLst/>
-            </a:prstTxWarp>
-          </a:bodyPr>
-          <a:lstStyle/>
-          <a:p>
-            <a:endParaRPr lang="pt-BR"/>
-          </a:p>
-        </p:txBody>
-      </p:sp>
-      <p:sp>
-        <p:nvSpPr>
-          <p:cNvPr id="10" name="AutoShape 14" descr="Resultado de imagem para p3-dx"/>
-          <p:cNvSpPr>
-            <a:spLocks noChangeAspect="1" noChangeArrowheads="1"/>
-          </p:cNvSpPr>
-          <p:nvPr/>
-        </p:nvSpPr>
-        <p:spPr bwMode="auto">
-          <a:xfrm>
-            <a:off x="612775" y="312737"/>
-            <a:ext cx="304800" cy="304801"/>
-          </a:xfrm>
-          <a:prstGeom prst="rect">
-            <a:avLst/>
-          </a:prstGeom>
-          <a:noFill/>
-          <a:extLst>
-            <a:ext uri="{909E8E84-426E-40DD-AFC4-6F175D3DCCD1}">
-              <a14:hiddenFill xmlns:a14="http://schemas.microsoft.com/office/drawing/2010/main">
-                <a:solidFill>
-                  <a:srgbClr val="FFFFFF"/>
-                </a:solidFill>
-              </a14:hiddenFill>
-            </a:ext>
-          </a:extLst>
-        </p:spPr>
-        <p:txBody>
-          <a:bodyPr vert="horz" wrap="square" lIns="91440" tIns="45720" rIns="91440" bIns="45720" numCol="1" anchor="t" anchorCtr="0" compatLnSpc="1">
-            <a:prstTxWarp prst="textNoShape">
-              <a:avLst/>
-            </a:prstTxWarp>
-          </a:bodyPr>
-          <a:lstStyle/>
-          <a:p>
-            <a:endParaRPr lang="pt-BR"/>
-          </a:p>
-        </p:txBody>
-      </p:sp>
-      <p:pic>
-        <p:nvPicPr>
-          <p:cNvPr id="1039" name="Picture 15"/>
-          <p:cNvPicPr>
-            <a:picLocks noChangeAspect="1" noChangeArrowheads="1"/>
-          </p:cNvPicPr>
-          <p:nvPr/>
-        </p:nvPicPr>
-        <p:blipFill>
-          <a:blip r:embed="rId7">
-            <a:extLst>
-              <a:ext uri="{28A0092B-C50C-407E-A947-70E740481C1C}">
-                <a14:useLocalDpi xmlns:a14="http://schemas.microsoft.com/office/drawing/2010/main" val="0"/>
-              </a:ext>
-            </a:extLst>
-          </a:blip>
-          <a:srcRect/>
-          <a:stretch>
-            <a:fillRect/>
-          </a:stretch>
-        </p:blipFill>
-        <p:spPr bwMode="auto">
-          <a:xfrm>
-            <a:off x="3487117" y="3865848"/>
-            <a:ext cx="2480387" cy="2491460"/>
+            <a:off x="467544" y="4293096"/>
+            <a:ext cx="4002539" cy="2138164"/>
           </a:xfrm>
           <a:prstGeom prst="rect">
             <a:avLst/>
@@ -5870,6 +5013,1351 @@
     </p:spTree>
     <p:extLst>
       <p:ext uri="{BB962C8B-B14F-4D97-AF65-F5344CB8AC3E}">
+        <p14:creationId xmlns:p14="http://schemas.microsoft.com/office/powerpoint/2010/main" val="3511222835"/>
+      </p:ext>
+    </p:extLst>
+  </p:cSld>
+  <p:clrMapOvr>
+    <a:masterClrMapping/>
+  </p:clrMapOvr>
+</p:sld>
+</file>
+
+<file path=ppt/slides/slide16.xml><?xml version="1.0" encoding="utf-8"?>
+<p:sld xmlns:a="http://schemas.openxmlformats.org/drawingml/2006/main" xmlns:r="http://schemas.openxmlformats.org/officeDocument/2006/relationships" xmlns:p="http://schemas.openxmlformats.org/presentationml/2006/main">
+  <p:cSld>
+    <p:spTree>
+      <p:nvGrpSpPr>
+        <p:cNvPr id="1" name=""/>
+        <p:cNvGrpSpPr/>
+        <p:nvPr/>
+      </p:nvGrpSpPr>
+      <p:grpSpPr>
+        <a:xfrm>
+          <a:off x="0" y="0"/>
+          <a:ext cx="0" cy="0"/>
+          <a:chOff x="0" y="0"/>
+          <a:chExt cx="0" cy="0"/>
+        </a:xfrm>
+      </p:grpSpPr>
+      <p:sp>
+        <p:nvSpPr>
+          <p:cNvPr id="2" name="Title 1"/>
+          <p:cNvSpPr>
+            <a:spLocks noGrp="1"/>
+          </p:cNvSpPr>
+          <p:nvPr>
+            <p:ph type="title"/>
+          </p:nvPr>
+        </p:nvSpPr>
+        <p:spPr/>
+        <p:txBody>
+          <a:bodyPr/>
+          <a:lstStyle/>
+          <a:p>
+            <a:r>
+              <a:rPr lang="pt-BR" dirty="0" smtClean="0"/>
+              <a:t>Outros Setores</a:t>
+            </a:r>
+            <a:endParaRPr lang="pt-BR" dirty="0"/>
+          </a:p>
+        </p:txBody>
+      </p:sp>
+      <p:sp>
+        <p:nvSpPr>
+          <p:cNvPr id="3" name="Content Placeholder 2"/>
+          <p:cNvSpPr>
+            <a:spLocks noGrp="1"/>
+          </p:cNvSpPr>
+          <p:nvPr>
+            <p:ph sz="quarter" idx="1"/>
+          </p:nvPr>
+        </p:nvSpPr>
+        <p:spPr/>
+        <p:txBody>
+          <a:bodyPr>
+            <a:normAutofit lnSpcReduction="10000"/>
+          </a:bodyPr>
+          <a:lstStyle/>
+          <a:p>
+            <a:r>
+              <a:rPr lang="pt-BR" dirty="0" smtClean="0"/>
+              <a:t>Cidades Inteligentes</a:t>
+            </a:r>
+          </a:p>
+          <a:p>
+            <a:pPr lvl="1"/>
+            <a:r>
+              <a:rPr lang="pt-BR" dirty="0" smtClean="0"/>
+              <a:t>Coleta automática de lixo</a:t>
+            </a:r>
+          </a:p>
+          <a:p>
+            <a:pPr lvl="1"/>
+            <a:r>
+              <a:rPr lang="pt-BR" dirty="0" smtClean="0"/>
+              <a:t>Segurança e monitoramento com uso de drones</a:t>
+            </a:r>
+          </a:p>
+          <a:p>
+            <a:r>
+              <a:rPr lang="pt-BR" dirty="0" smtClean="0"/>
+              <a:t>Indústrias</a:t>
+            </a:r>
+          </a:p>
+          <a:p>
+            <a:pPr lvl="1"/>
+            <a:r>
+              <a:rPr lang="pt-BR" dirty="0" smtClean="0"/>
+              <a:t>Robôs já são lugar comum e </a:t>
+            </a:r>
+            <a:r>
+              <a:rPr lang="pt-BR" dirty="0" smtClean="0"/>
+              <a:t>vendas crescem a cada ano</a:t>
+            </a:r>
+          </a:p>
+          <a:p>
+            <a:pPr lvl="1"/>
+            <a:r>
+              <a:rPr lang="pt-BR" dirty="0"/>
+              <a:t>S</a:t>
+            </a:r>
+            <a:r>
+              <a:rPr lang="pt-BR" dirty="0" smtClean="0"/>
+              <a:t>erão </a:t>
+            </a:r>
+            <a:r>
+              <a:rPr lang="pt-BR" dirty="0" smtClean="0"/>
+              <a:t>integrados com IoT conforme for sendo implantada</a:t>
+            </a:r>
+          </a:p>
+          <a:p>
+            <a:pPr lvl="1"/>
+            <a:r>
+              <a:rPr lang="pt-BR" dirty="0"/>
+              <a:t>S</a:t>
+            </a:r>
+            <a:r>
+              <a:rPr lang="pt-BR" dirty="0" smtClean="0"/>
+              <a:t>e tornarão mais inteligentes</a:t>
+            </a:r>
+          </a:p>
+          <a:p>
+            <a:r>
+              <a:rPr lang="pt-BR" dirty="0" smtClean="0"/>
+              <a:t>Varejo</a:t>
+            </a:r>
+          </a:p>
+          <a:p>
+            <a:pPr lvl="1"/>
+            <a:r>
+              <a:rPr lang="pt-BR" dirty="0" smtClean="0"/>
+              <a:t>Atendentes/vendedores robóticos</a:t>
+            </a:r>
+          </a:p>
+          <a:p>
+            <a:pPr lvl="1"/>
+            <a:r>
+              <a:rPr lang="pt-BR" dirty="0" smtClean="0"/>
+              <a:t>Armazenar e buscar produtos – como em depósitos</a:t>
+            </a:r>
+          </a:p>
+          <a:p>
+            <a:r>
+              <a:rPr lang="pt-BR" dirty="0" smtClean="0"/>
+              <a:t>Automóveis</a:t>
+            </a:r>
+          </a:p>
+          <a:p>
+            <a:pPr lvl="1"/>
+            <a:r>
+              <a:rPr lang="pt-BR" dirty="0" smtClean="0"/>
+              <a:t>Carro autônomo </a:t>
+            </a:r>
+            <a:r>
+              <a:rPr lang="pt-BR" dirty="0" smtClean="0">
+                <a:sym typeface="Wingdings" pitchFamily="2" charset="2"/>
+              </a:rPr>
+              <a:t> Robô móvel</a:t>
+            </a:r>
+            <a:endParaRPr lang="pt-BR" dirty="0" smtClean="0"/>
+          </a:p>
+        </p:txBody>
+      </p:sp>
+    </p:spTree>
+    <p:extLst>
+      <p:ext uri="{BB962C8B-B14F-4D97-AF65-F5344CB8AC3E}">
+        <p14:creationId xmlns:p14="http://schemas.microsoft.com/office/powerpoint/2010/main" val="649753901"/>
+      </p:ext>
+    </p:extLst>
+  </p:cSld>
+  <p:clrMapOvr>
+    <a:masterClrMapping/>
+  </p:clrMapOvr>
+</p:sld>
+</file>
+
+<file path=ppt/slides/slide17.xml><?xml version="1.0" encoding="utf-8"?>
+<p:sld xmlns:a="http://schemas.openxmlformats.org/drawingml/2006/main" xmlns:r="http://schemas.openxmlformats.org/officeDocument/2006/relationships" xmlns:p="http://schemas.openxmlformats.org/presentationml/2006/main">
+  <p:cSld>
+    <p:spTree>
+      <p:nvGrpSpPr>
+        <p:cNvPr id="1" name=""/>
+        <p:cNvGrpSpPr/>
+        <p:nvPr/>
+      </p:nvGrpSpPr>
+      <p:grpSpPr>
+        <a:xfrm>
+          <a:off x="0" y="0"/>
+          <a:ext cx="0" cy="0"/>
+          <a:chOff x="0" y="0"/>
+          <a:chExt cx="0" cy="0"/>
+        </a:xfrm>
+      </p:grpSpPr>
+      <p:sp>
+        <p:nvSpPr>
+          <p:cNvPr id="2" name="Title 1"/>
+          <p:cNvSpPr>
+            <a:spLocks noGrp="1"/>
+          </p:cNvSpPr>
+          <p:nvPr>
+            <p:ph type="title"/>
+          </p:nvPr>
+        </p:nvSpPr>
+        <p:spPr/>
+        <p:txBody>
+          <a:bodyPr/>
+          <a:lstStyle/>
+          <a:p>
+            <a:r>
+              <a:rPr lang="pt-BR" dirty="0" smtClean="0"/>
+              <a:t>Conclusão</a:t>
+            </a:r>
+            <a:endParaRPr lang="pt-BR" dirty="0"/>
+          </a:p>
+        </p:txBody>
+      </p:sp>
+      <p:sp>
+        <p:nvSpPr>
+          <p:cNvPr id="3" name="Content Placeholder 2"/>
+          <p:cNvSpPr>
+            <a:spLocks noGrp="1"/>
+          </p:cNvSpPr>
+          <p:nvPr>
+            <p:ph sz="quarter" idx="1"/>
+          </p:nvPr>
+        </p:nvSpPr>
+        <p:spPr/>
+        <p:txBody>
+          <a:bodyPr/>
+          <a:lstStyle/>
+          <a:p>
+            <a:r>
+              <a:rPr lang="pt-BR" dirty="0" smtClean="0"/>
+              <a:t>Já existem muitas aplicações envolvendo robótica e IoT</a:t>
+            </a:r>
+          </a:p>
+          <a:p>
+            <a:r>
+              <a:rPr lang="pt-BR" dirty="0" smtClean="0"/>
+              <a:t>Torna possíveis robôs muito mais inteligentes</a:t>
+            </a:r>
+          </a:p>
+          <a:p>
+            <a:r>
+              <a:rPr lang="pt-BR" dirty="0" smtClean="0"/>
+              <a:t>Bastante interesse acadêmico e da indústria</a:t>
+            </a:r>
+          </a:p>
+          <a:p>
+            <a:r>
+              <a:rPr lang="pt-BR" dirty="0" smtClean="0"/>
+              <a:t>A tendência é que haja um crescimento muito grande</a:t>
+            </a:r>
+          </a:p>
+          <a:p>
+            <a:pPr lvl="1"/>
+            <a:r>
+              <a:rPr lang="pt-BR" dirty="0" smtClean="0"/>
+              <a:t>Conforme os custos de IoT caem</a:t>
+            </a:r>
+          </a:p>
+          <a:p>
+            <a:pPr lvl="1"/>
+            <a:r>
+              <a:rPr lang="pt-BR" dirty="0" smtClean="0"/>
+              <a:t>Com o amadurecimento da robótica</a:t>
+            </a:r>
+            <a:endParaRPr lang="pt-BR" dirty="0"/>
+          </a:p>
+        </p:txBody>
+      </p:sp>
+    </p:spTree>
+    <p:extLst>
+      <p:ext uri="{BB962C8B-B14F-4D97-AF65-F5344CB8AC3E}">
+        <p14:creationId xmlns:p14="http://schemas.microsoft.com/office/powerpoint/2010/main" val="3527821407"/>
+      </p:ext>
+    </p:extLst>
+  </p:cSld>
+  <p:clrMapOvr>
+    <a:masterClrMapping/>
+  </p:clrMapOvr>
+</p:sld>
+</file>
+
+<file path=ppt/slides/slide18.xml><?xml version="1.0" encoding="utf-8"?>
+<p:sld xmlns:a="http://schemas.openxmlformats.org/drawingml/2006/main" xmlns:r="http://schemas.openxmlformats.org/officeDocument/2006/relationships" xmlns:p="http://schemas.openxmlformats.org/presentationml/2006/main">
+  <p:cSld>
+    <p:spTree>
+      <p:nvGrpSpPr>
+        <p:cNvPr id="1" name=""/>
+        <p:cNvGrpSpPr/>
+        <p:nvPr/>
+      </p:nvGrpSpPr>
+      <p:grpSpPr>
+        <a:xfrm>
+          <a:off x="0" y="0"/>
+          <a:ext cx="0" cy="0"/>
+          <a:chOff x="0" y="0"/>
+          <a:chExt cx="0" cy="0"/>
+        </a:xfrm>
+      </p:grpSpPr>
+      <p:sp>
+        <p:nvSpPr>
+          <p:cNvPr id="2" name="Title 1"/>
+          <p:cNvSpPr>
+            <a:spLocks noGrp="1"/>
+          </p:cNvSpPr>
+          <p:nvPr>
+            <p:ph type="title"/>
+          </p:nvPr>
+        </p:nvSpPr>
+        <p:spPr/>
+        <p:txBody>
+          <a:bodyPr/>
+          <a:lstStyle/>
+          <a:p>
+            <a:r>
+              <a:rPr lang="pt-BR" dirty="0" smtClean="0"/>
+              <a:t>Dúvidas</a:t>
+            </a:r>
+            <a:endParaRPr lang="pt-BR" dirty="0"/>
+          </a:p>
+        </p:txBody>
+      </p:sp>
+      <p:sp>
+        <p:nvSpPr>
+          <p:cNvPr id="3" name="Content Placeholder 2"/>
+          <p:cNvSpPr>
+            <a:spLocks noGrp="1"/>
+          </p:cNvSpPr>
+          <p:nvPr>
+            <p:ph sz="quarter" idx="1"/>
+          </p:nvPr>
+        </p:nvSpPr>
+        <p:spPr/>
+        <p:txBody>
+          <a:bodyPr/>
+          <a:lstStyle/>
+          <a:p>
+            <a:endParaRPr lang="pt-BR"/>
+          </a:p>
+        </p:txBody>
+      </p:sp>
+    </p:spTree>
+    <p:extLst>
+      <p:ext uri="{BB962C8B-B14F-4D97-AF65-F5344CB8AC3E}">
+        <p14:creationId xmlns:p14="http://schemas.microsoft.com/office/powerpoint/2010/main" val="3602084392"/>
+      </p:ext>
+    </p:extLst>
+  </p:cSld>
+  <p:clrMapOvr>
+    <a:masterClrMapping/>
+  </p:clrMapOvr>
+</p:sld>
+</file>
+
+<file path=ppt/slides/slide19.xml><?xml version="1.0" encoding="utf-8"?>
+<p:sld xmlns:a="http://schemas.openxmlformats.org/drawingml/2006/main" xmlns:r="http://schemas.openxmlformats.org/officeDocument/2006/relationships" xmlns:p="http://schemas.openxmlformats.org/presentationml/2006/main">
+  <p:cSld>
+    <p:spTree>
+      <p:nvGrpSpPr>
+        <p:cNvPr id="1" name=""/>
+        <p:cNvGrpSpPr/>
+        <p:nvPr/>
+      </p:nvGrpSpPr>
+      <p:grpSpPr>
+        <a:xfrm>
+          <a:off x="0" y="0"/>
+          <a:ext cx="0" cy="0"/>
+          <a:chOff x="0" y="0"/>
+          <a:chExt cx="0" cy="0"/>
+        </a:xfrm>
+      </p:grpSpPr>
+      <p:sp>
+        <p:nvSpPr>
+          <p:cNvPr id="2" name="Title 1"/>
+          <p:cNvSpPr>
+            <a:spLocks noGrp="1"/>
+          </p:cNvSpPr>
+          <p:nvPr>
+            <p:ph type="title"/>
+          </p:nvPr>
+        </p:nvSpPr>
+        <p:spPr/>
+        <p:txBody>
+          <a:bodyPr/>
+          <a:lstStyle/>
+          <a:p>
+            <a:r>
+              <a:rPr lang="pt-BR" dirty="0" smtClean="0"/>
+              <a:t>Referências</a:t>
+            </a:r>
+            <a:endParaRPr lang="pt-BR" dirty="0"/>
+          </a:p>
+        </p:txBody>
+      </p:sp>
+      <p:sp>
+        <p:nvSpPr>
+          <p:cNvPr id="3" name="Content Placeholder 2"/>
+          <p:cNvSpPr>
+            <a:spLocks noGrp="1"/>
+          </p:cNvSpPr>
+          <p:nvPr>
+            <p:ph sz="quarter" idx="1"/>
+          </p:nvPr>
+        </p:nvSpPr>
+        <p:spPr/>
+        <p:txBody>
+          <a:bodyPr/>
+          <a:lstStyle/>
+          <a:p>
+            <a:r>
+              <a:rPr lang="pt-BR" dirty="0">
+                <a:hlinkClick r:id="rId2"/>
+              </a:rPr>
+              <a:t>http://</a:t>
+            </a:r>
+            <a:r>
+              <a:rPr lang="pt-BR" dirty="0" smtClean="0">
+                <a:hlinkClick r:id="rId2"/>
+              </a:rPr>
+              <a:t>cacm.acm.org/news/205836-the-beginning-of-the-internet-of-robot-things/fulltext</a:t>
+            </a:r>
+            <a:endParaRPr lang="pt-BR" dirty="0" smtClean="0"/>
+          </a:p>
+          <a:p>
+            <a:endParaRPr lang="pt-BR" dirty="0"/>
+          </a:p>
+        </p:txBody>
+      </p:sp>
+    </p:spTree>
+    <p:extLst>
+      <p:ext uri="{BB962C8B-B14F-4D97-AF65-F5344CB8AC3E}">
+        <p14:creationId xmlns:p14="http://schemas.microsoft.com/office/powerpoint/2010/main" val="964487792"/>
+      </p:ext>
+    </p:extLst>
+  </p:cSld>
+  <p:clrMapOvr>
+    <a:masterClrMapping/>
+  </p:clrMapOvr>
+</p:sld>
+</file>
+
+<file path=ppt/slides/slide2.xml><?xml version="1.0" encoding="utf-8"?>
+<p:sld xmlns:a="http://schemas.openxmlformats.org/drawingml/2006/main" xmlns:r="http://schemas.openxmlformats.org/officeDocument/2006/relationships" xmlns:p="http://schemas.openxmlformats.org/presentationml/2006/main">
+  <p:cSld>
+    <p:spTree>
+      <p:nvGrpSpPr>
+        <p:cNvPr id="1" name=""/>
+        <p:cNvGrpSpPr/>
+        <p:nvPr/>
+      </p:nvGrpSpPr>
+      <p:grpSpPr>
+        <a:xfrm>
+          <a:off x="0" y="0"/>
+          <a:ext cx="0" cy="0"/>
+          <a:chOff x="0" y="0"/>
+          <a:chExt cx="0" cy="0"/>
+        </a:xfrm>
+      </p:grpSpPr>
+      <p:sp>
+        <p:nvSpPr>
+          <p:cNvPr id="2" name="Title 1"/>
+          <p:cNvSpPr>
+            <a:spLocks noGrp="1"/>
+          </p:cNvSpPr>
+          <p:nvPr>
+            <p:ph type="title"/>
+          </p:nvPr>
+        </p:nvSpPr>
+        <p:spPr/>
+        <p:txBody>
+          <a:bodyPr/>
+          <a:lstStyle/>
+          <a:p>
+            <a:r>
+              <a:rPr lang="pt-BR" dirty="0" smtClean="0"/>
+              <a:t>Agenda</a:t>
+            </a:r>
+            <a:endParaRPr lang="pt-BR" dirty="0"/>
+          </a:p>
+        </p:txBody>
+      </p:sp>
+      <p:sp>
+        <p:nvSpPr>
+          <p:cNvPr id="3" name="Content Placeholder 2"/>
+          <p:cNvSpPr>
+            <a:spLocks noGrp="1"/>
+          </p:cNvSpPr>
+          <p:nvPr>
+            <p:ph sz="quarter" idx="1"/>
+          </p:nvPr>
+        </p:nvSpPr>
+        <p:spPr/>
+        <p:txBody>
+          <a:bodyPr>
+            <a:normAutofit/>
+          </a:bodyPr>
+          <a:lstStyle/>
+          <a:p>
+            <a:r>
+              <a:rPr lang="pt-BR" dirty="0" smtClean="0"/>
+              <a:t>Robótica – Introdução</a:t>
+            </a:r>
+          </a:p>
+          <a:p>
+            <a:pPr lvl="1"/>
+            <a:r>
+              <a:rPr lang="pt-BR" dirty="0" smtClean="0"/>
+              <a:t>Tipos de robôs</a:t>
+            </a:r>
+          </a:p>
+          <a:p>
+            <a:pPr lvl="1"/>
+            <a:r>
+              <a:rPr lang="pt-BR" dirty="0" smtClean="0"/>
+              <a:t>Robótica em Nuvem</a:t>
+            </a:r>
+          </a:p>
+          <a:p>
+            <a:r>
+              <a:rPr lang="pt-BR" dirty="0" smtClean="0"/>
+              <a:t>Semelhanças e convergência com IoT</a:t>
+            </a:r>
+          </a:p>
+          <a:p>
+            <a:r>
+              <a:rPr lang="pt-BR" dirty="0" smtClean="0"/>
+              <a:t>Aplicações em diferentes segmentos</a:t>
+            </a:r>
+          </a:p>
+          <a:p>
+            <a:pPr lvl="1"/>
+            <a:r>
+              <a:rPr lang="pt-BR" dirty="0" smtClean="0"/>
+              <a:t>Robôs Domésticos</a:t>
+            </a:r>
+          </a:p>
+          <a:p>
+            <a:pPr lvl="1"/>
+            <a:r>
+              <a:rPr lang="pt-BR" dirty="0" smtClean="0"/>
+              <a:t>Warehouses</a:t>
+            </a:r>
+          </a:p>
+          <a:p>
+            <a:pPr lvl="1"/>
+            <a:r>
+              <a:rPr lang="pt-BR" dirty="0" smtClean="0"/>
+              <a:t>Outros</a:t>
+            </a:r>
+            <a:endParaRPr lang="pt-BR" dirty="0"/>
+          </a:p>
+        </p:txBody>
+      </p:sp>
+    </p:spTree>
+    <p:extLst>
+      <p:ext uri="{BB962C8B-B14F-4D97-AF65-F5344CB8AC3E}">
+        <p14:creationId xmlns:p14="http://schemas.microsoft.com/office/powerpoint/2010/main" val="3593250634"/>
+      </p:ext>
+    </p:extLst>
+  </p:cSld>
+  <p:clrMapOvr>
+    <a:masterClrMapping/>
+  </p:clrMapOvr>
+</p:sld>
+</file>
+
+<file path=ppt/slides/slide3.xml><?xml version="1.0" encoding="utf-8"?>
+<p:sld xmlns:a="http://schemas.openxmlformats.org/drawingml/2006/main" xmlns:r="http://schemas.openxmlformats.org/officeDocument/2006/relationships" xmlns:p="http://schemas.openxmlformats.org/presentationml/2006/main">
+  <p:cSld>
+    <p:spTree>
+      <p:nvGrpSpPr>
+        <p:cNvPr id="1" name=""/>
+        <p:cNvGrpSpPr/>
+        <p:nvPr/>
+      </p:nvGrpSpPr>
+      <p:grpSpPr>
+        <a:xfrm>
+          <a:off x="0" y="0"/>
+          <a:ext cx="0" cy="0"/>
+          <a:chOff x="0" y="0"/>
+          <a:chExt cx="0" cy="0"/>
+        </a:xfrm>
+      </p:grpSpPr>
+      <p:sp>
+        <p:nvSpPr>
+          <p:cNvPr id="2" name="Title 1"/>
+          <p:cNvSpPr>
+            <a:spLocks noGrp="1"/>
+          </p:cNvSpPr>
+          <p:nvPr>
+            <p:ph type="title"/>
+          </p:nvPr>
+        </p:nvSpPr>
+        <p:spPr/>
+        <p:txBody>
+          <a:bodyPr/>
+          <a:lstStyle/>
+          <a:p>
+            <a:r>
+              <a:rPr lang="pt-BR" dirty="0" smtClean="0"/>
+              <a:t>Robótica</a:t>
+            </a:r>
+            <a:endParaRPr lang="pt-BR" dirty="0"/>
+          </a:p>
+        </p:txBody>
+      </p:sp>
+      <p:sp>
+        <p:nvSpPr>
+          <p:cNvPr id="3" name="Content Placeholder 2"/>
+          <p:cNvSpPr>
+            <a:spLocks noGrp="1"/>
+          </p:cNvSpPr>
+          <p:nvPr>
+            <p:ph sz="quarter" idx="1"/>
+          </p:nvPr>
+        </p:nvSpPr>
+        <p:spPr>
+          <a:xfrm>
+            <a:off x="457200" y="1219200"/>
+            <a:ext cx="8229600" cy="5162128"/>
+          </a:xfrm>
+        </p:spPr>
+        <p:txBody>
+          <a:bodyPr>
+            <a:normAutofit lnSpcReduction="10000"/>
+          </a:bodyPr>
+          <a:lstStyle/>
+          <a:p>
+            <a:r>
+              <a:rPr lang="pt-BR" dirty="0" smtClean="0"/>
+              <a:t>Robôs: Realizam tarefas para os seres humanos</a:t>
+            </a:r>
+          </a:p>
+          <a:p>
+            <a:pPr lvl="1"/>
+            <a:r>
+              <a:rPr lang="pt-BR" dirty="0" smtClean="0"/>
+              <a:t>Perigosas, repetitivas, distantes, ...</a:t>
+            </a:r>
+          </a:p>
+          <a:p>
+            <a:pPr lvl="1"/>
+            <a:r>
+              <a:rPr lang="pt-BR" dirty="0" smtClean="0"/>
+              <a:t>Operados de maneira autônoma ou semi-autônoma</a:t>
+            </a:r>
+          </a:p>
+          <a:p>
+            <a:pPr lvl="1"/>
+            <a:r>
+              <a:rPr lang="pt-BR" dirty="0" smtClean="0"/>
+              <a:t>Se comunicam com seres humanos ou outros robôs</a:t>
+            </a:r>
+          </a:p>
+          <a:p>
+            <a:pPr lvl="1"/>
+            <a:r>
+              <a:rPr lang="pt-BR" dirty="0" smtClean="0"/>
+              <a:t>Interagem com o ambiente por meio de sensores (sonar, </a:t>
+            </a:r>
+            <a:r>
+              <a:rPr lang="pt-BR" dirty="0"/>
+              <a:t>laser, </a:t>
+            </a:r>
+            <a:r>
+              <a:rPr lang="pt-BR" dirty="0" smtClean="0"/>
+              <a:t>infravermelho, câmeras, bumpers) e atuadores</a:t>
+            </a:r>
+          </a:p>
+          <a:p>
+            <a:r>
+              <a:rPr lang="pt-BR" dirty="0" smtClean="0"/>
+              <a:t>Principais Aplicações</a:t>
+            </a:r>
+          </a:p>
+          <a:p>
+            <a:pPr lvl="1"/>
+            <a:r>
+              <a:rPr lang="pt-BR" dirty="0" smtClean="0"/>
+              <a:t>Indústria</a:t>
+            </a:r>
+          </a:p>
+          <a:p>
+            <a:pPr lvl="1"/>
+            <a:r>
+              <a:rPr lang="pt-BR" dirty="0" smtClean="0"/>
+              <a:t>Tarefas Domésticas</a:t>
+            </a:r>
+          </a:p>
+          <a:p>
+            <a:pPr lvl="1"/>
+            <a:r>
+              <a:rPr lang="pt-BR" dirty="0" smtClean="0"/>
+              <a:t>Exploração</a:t>
+            </a:r>
+          </a:p>
+          <a:p>
+            <a:pPr lvl="1"/>
+            <a:r>
+              <a:rPr lang="pt-BR" dirty="0" smtClean="0"/>
+              <a:t>Missões em Ambientes Perigosos</a:t>
+            </a:r>
+          </a:p>
+          <a:p>
+            <a:pPr lvl="1"/>
+            <a:r>
+              <a:rPr lang="pt-BR" dirty="0" smtClean="0"/>
+              <a:t>Missões Espaciais</a:t>
+            </a:r>
+          </a:p>
+          <a:p>
+            <a:pPr lvl="1"/>
+            <a:r>
+              <a:rPr lang="pt-BR" dirty="0" smtClean="0"/>
+              <a:t>Fins Educacionais</a:t>
+            </a:r>
+          </a:p>
+        </p:txBody>
+      </p:sp>
+    </p:spTree>
+    <p:extLst>
+      <p:ext uri="{BB962C8B-B14F-4D97-AF65-F5344CB8AC3E}">
+        <p14:creationId xmlns:p14="http://schemas.microsoft.com/office/powerpoint/2010/main" val="156060572"/>
+      </p:ext>
+    </p:extLst>
+  </p:cSld>
+  <p:clrMapOvr>
+    <a:masterClrMapping/>
+  </p:clrMapOvr>
+</p:sld>
+</file>
+
+<file path=ppt/slides/slide4.xml><?xml version="1.0" encoding="utf-8"?>
+<p:sld xmlns:a="http://schemas.openxmlformats.org/drawingml/2006/main" xmlns:r="http://schemas.openxmlformats.org/officeDocument/2006/relationships" xmlns:p="http://schemas.openxmlformats.org/presentationml/2006/main">
+  <p:cSld>
+    <p:spTree>
+      <p:nvGrpSpPr>
+        <p:cNvPr id="1" name=""/>
+        <p:cNvGrpSpPr/>
+        <p:nvPr/>
+      </p:nvGrpSpPr>
+      <p:grpSpPr>
+        <a:xfrm>
+          <a:off x="0" y="0"/>
+          <a:ext cx="0" cy="0"/>
+          <a:chOff x="0" y="0"/>
+          <a:chExt cx="0" cy="0"/>
+        </a:xfrm>
+      </p:grpSpPr>
+      <p:sp>
+        <p:nvSpPr>
+          <p:cNvPr id="2" name="Title 1"/>
+          <p:cNvSpPr>
+            <a:spLocks noGrp="1"/>
+          </p:cNvSpPr>
+          <p:nvPr>
+            <p:ph type="title"/>
+          </p:nvPr>
+        </p:nvSpPr>
+        <p:spPr/>
+        <p:txBody>
+          <a:bodyPr/>
+          <a:lstStyle/>
+          <a:p>
+            <a:r>
+              <a:rPr lang="pt-BR" dirty="0" smtClean="0"/>
+              <a:t>Tipos de Robôs</a:t>
+            </a:r>
+            <a:endParaRPr lang="pt-BR" dirty="0"/>
+          </a:p>
+        </p:txBody>
+      </p:sp>
+      <p:sp>
+        <p:nvSpPr>
+          <p:cNvPr id="3" name="Content Placeholder 2"/>
+          <p:cNvSpPr>
+            <a:spLocks noGrp="1"/>
+          </p:cNvSpPr>
+          <p:nvPr>
+            <p:ph sz="quarter" idx="1"/>
+          </p:nvPr>
+        </p:nvSpPr>
+        <p:spPr/>
+        <p:txBody>
+          <a:bodyPr/>
+          <a:lstStyle/>
+          <a:p>
+            <a:r>
+              <a:rPr lang="pt-BR" dirty="0" smtClean="0"/>
+              <a:t>Robôs Móveis</a:t>
+            </a:r>
+          </a:p>
+          <a:p>
+            <a:pPr lvl="1"/>
+            <a:r>
+              <a:rPr lang="pt-BR" dirty="0" smtClean="0"/>
+              <a:t>Terrestres</a:t>
+            </a:r>
+          </a:p>
+          <a:p>
+            <a:pPr lvl="2"/>
+            <a:r>
+              <a:rPr lang="pt-BR" dirty="0" smtClean="0"/>
+              <a:t>Rodas ou esteiras</a:t>
+            </a:r>
+          </a:p>
+          <a:p>
+            <a:pPr lvl="2"/>
+            <a:r>
+              <a:rPr lang="pt-BR" dirty="0" smtClean="0"/>
+              <a:t>Pernas</a:t>
+            </a:r>
+          </a:p>
+          <a:p>
+            <a:pPr lvl="2"/>
+            <a:r>
+              <a:rPr lang="pt-BR" dirty="0" smtClean="0"/>
+              <a:t>Híbridos</a:t>
+            </a:r>
+          </a:p>
+          <a:p>
+            <a:pPr lvl="1"/>
+            <a:r>
+              <a:rPr lang="pt-BR" dirty="0" smtClean="0"/>
+              <a:t>Humanóides</a:t>
+            </a:r>
+          </a:p>
+          <a:p>
+            <a:pPr lvl="1"/>
+            <a:r>
+              <a:rPr lang="pt-BR" dirty="0" smtClean="0"/>
+              <a:t>Aéreos</a:t>
+            </a:r>
+          </a:p>
+          <a:p>
+            <a:pPr lvl="1"/>
+            <a:r>
+              <a:rPr lang="pt-BR" dirty="0" smtClean="0"/>
+              <a:t>Aquáticos</a:t>
+            </a:r>
+          </a:p>
+          <a:p>
+            <a:pPr lvl="1"/>
+            <a:r>
+              <a:rPr lang="pt-BR" dirty="0" smtClean="0"/>
+              <a:t>Modulares</a:t>
+            </a:r>
+          </a:p>
+          <a:p>
+            <a:pPr lvl="1"/>
+            <a:endParaRPr lang="pt-BR" dirty="0"/>
+          </a:p>
+        </p:txBody>
+      </p:sp>
+    </p:spTree>
+    <p:extLst>
+      <p:ext uri="{BB962C8B-B14F-4D97-AF65-F5344CB8AC3E}">
+        <p14:creationId xmlns:p14="http://schemas.microsoft.com/office/powerpoint/2010/main" val="2766568419"/>
+      </p:ext>
+    </p:extLst>
+  </p:cSld>
+  <p:clrMapOvr>
+    <a:masterClrMapping/>
+  </p:clrMapOvr>
+</p:sld>
+</file>
+
+<file path=ppt/slides/slide5.xml><?xml version="1.0" encoding="utf-8"?>
+<p:sld xmlns:a="http://schemas.openxmlformats.org/drawingml/2006/main" xmlns:r="http://schemas.openxmlformats.org/officeDocument/2006/relationships" xmlns:p="http://schemas.openxmlformats.org/presentationml/2006/main">
+  <p:cSld>
+    <p:spTree>
+      <p:nvGrpSpPr>
+        <p:cNvPr id="1" name=""/>
+        <p:cNvGrpSpPr/>
+        <p:nvPr/>
+      </p:nvGrpSpPr>
+      <p:grpSpPr>
+        <a:xfrm>
+          <a:off x="0" y="0"/>
+          <a:ext cx="0" cy="0"/>
+          <a:chOff x="0" y="0"/>
+          <a:chExt cx="0" cy="0"/>
+        </a:xfrm>
+      </p:grpSpPr>
+      <p:sp>
+        <p:nvSpPr>
+          <p:cNvPr id="2" name="Title 1"/>
+          <p:cNvSpPr>
+            <a:spLocks noGrp="1"/>
+          </p:cNvSpPr>
+          <p:nvPr>
+            <p:ph type="title"/>
+          </p:nvPr>
+        </p:nvSpPr>
+        <p:spPr/>
+        <p:txBody>
+          <a:bodyPr/>
+          <a:lstStyle/>
+          <a:p>
+            <a:r>
+              <a:rPr lang="pt-BR" dirty="0" smtClean="0"/>
+              <a:t>Tipos de Robôs</a:t>
+            </a:r>
+            <a:endParaRPr lang="pt-BR" dirty="0"/>
+          </a:p>
+        </p:txBody>
+      </p:sp>
+      <p:pic>
+        <p:nvPicPr>
+          <p:cNvPr id="5" name="Picture 4" descr="https://i.ytimg.com/vi/4oSavAHf0dg/hqdefault.jpg"/>
+          <p:cNvPicPr>
+            <a:picLocks noChangeAspect="1" noChangeArrowheads="1"/>
+          </p:cNvPicPr>
+          <p:nvPr/>
+        </p:nvPicPr>
+        <p:blipFill>
+          <a:blip r:embed="rId2">
+            <a:extLst>
+              <a:ext uri="{28A0092B-C50C-407E-A947-70E740481C1C}">
+                <a14:useLocalDpi xmlns:a14="http://schemas.microsoft.com/office/drawing/2010/main" val="0"/>
+              </a:ext>
+            </a:extLst>
+          </a:blip>
+          <a:srcRect/>
+          <a:stretch>
+            <a:fillRect/>
+          </a:stretch>
+        </p:blipFill>
+        <p:spPr bwMode="auto">
+          <a:xfrm>
+            <a:off x="6156176" y="4232418"/>
+            <a:ext cx="2880318" cy="2160239"/>
+          </a:xfrm>
+          <a:prstGeom prst="rect">
+            <a:avLst/>
+          </a:prstGeom>
+          <a:noFill/>
+          <a:extLst>
+            <a:ext uri="{909E8E84-426E-40DD-AFC4-6F175D3DCCD1}">
+              <a14:hiddenFill xmlns:a14="http://schemas.microsoft.com/office/drawing/2010/main">
+                <a:solidFill>
+                  <a:srgbClr val="FFFFFF"/>
+                </a:solidFill>
+              </a14:hiddenFill>
+            </a:ext>
+          </a:extLst>
+        </p:spPr>
+      </p:pic>
+      <p:pic>
+        <p:nvPicPr>
+          <p:cNvPr id="6" name="Picture 6" descr="http://www.rutgersprep.org/kendall/7thgrade/cycleA_2008_09/zi/AQUAreading_pic.jpg"/>
+          <p:cNvPicPr>
+            <a:picLocks noChangeAspect="1" noChangeArrowheads="1"/>
+          </p:cNvPicPr>
+          <p:nvPr/>
+        </p:nvPicPr>
+        <p:blipFill>
+          <a:blip r:embed="rId3">
+            <a:extLst>
+              <a:ext uri="{28A0092B-C50C-407E-A947-70E740481C1C}">
+                <a14:useLocalDpi xmlns:a14="http://schemas.microsoft.com/office/drawing/2010/main" val="0"/>
+              </a:ext>
+            </a:extLst>
+          </a:blip>
+          <a:srcRect/>
+          <a:stretch>
+            <a:fillRect/>
+          </a:stretch>
+        </p:blipFill>
+        <p:spPr bwMode="auto">
+          <a:xfrm>
+            <a:off x="290629" y="4232418"/>
+            <a:ext cx="2865213" cy="2148910"/>
+          </a:xfrm>
+          <a:prstGeom prst="rect">
+            <a:avLst/>
+          </a:prstGeom>
+          <a:noFill/>
+          <a:extLst>
+            <a:ext uri="{909E8E84-426E-40DD-AFC4-6F175D3DCCD1}">
+              <a14:hiddenFill xmlns:a14="http://schemas.microsoft.com/office/drawing/2010/main">
+                <a:solidFill>
+                  <a:srgbClr val="FFFFFF"/>
+                </a:solidFill>
+              </a14:hiddenFill>
+            </a:ext>
+          </a:extLst>
+        </p:spPr>
+      </p:pic>
+      <p:pic>
+        <p:nvPicPr>
+          <p:cNvPr id="1026" name="Picture 2" descr="Resultado de imagem para humanoid robot"/>
+          <p:cNvPicPr>
+            <a:picLocks noChangeAspect="1" noChangeArrowheads="1"/>
+          </p:cNvPicPr>
+          <p:nvPr/>
+        </p:nvPicPr>
+        <p:blipFill>
+          <a:blip r:embed="rId4">
+            <a:extLst>
+              <a:ext uri="{28A0092B-C50C-407E-A947-70E740481C1C}">
+                <a14:useLocalDpi xmlns:a14="http://schemas.microsoft.com/office/drawing/2010/main" val="0"/>
+              </a:ext>
+            </a:extLst>
+          </a:blip>
+          <a:srcRect/>
+          <a:stretch>
+            <a:fillRect/>
+          </a:stretch>
+        </p:blipFill>
+        <p:spPr bwMode="auto">
+          <a:xfrm>
+            <a:off x="6142143" y="1196752"/>
+            <a:ext cx="2750337" cy="2750337"/>
+          </a:xfrm>
+          <a:prstGeom prst="rect">
+            <a:avLst/>
+          </a:prstGeom>
+          <a:noFill/>
+          <a:extLst>
+            <a:ext uri="{909E8E84-426E-40DD-AFC4-6F175D3DCCD1}">
+              <a14:hiddenFill xmlns:a14="http://schemas.microsoft.com/office/drawing/2010/main">
+                <a:solidFill>
+                  <a:srgbClr val="FFFFFF"/>
+                </a:solidFill>
+              </a14:hiddenFill>
+            </a:ext>
+          </a:extLst>
+        </p:spPr>
+      </p:pic>
+      <p:sp>
+        <p:nvSpPr>
+          <p:cNvPr id="7" name="AutoShape 4" descr="Resultado de imagem para flying robot"/>
+          <p:cNvSpPr>
+            <a:spLocks noChangeAspect="1" noChangeArrowheads="1"/>
+          </p:cNvSpPr>
+          <p:nvPr/>
+        </p:nvSpPr>
+        <p:spPr bwMode="auto">
+          <a:xfrm>
+            <a:off x="155575" y="-144463"/>
+            <a:ext cx="304800" cy="304801"/>
+          </a:xfrm>
+          <a:prstGeom prst="rect">
+            <a:avLst/>
+          </a:prstGeom>
+          <a:noFill/>
+          <a:extLst>
+            <a:ext uri="{909E8E84-426E-40DD-AFC4-6F175D3DCCD1}">
+              <a14:hiddenFill xmlns:a14="http://schemas.microsoft.com/office/drawing/2010/main">
+                <a:solidFill>
+                  <a:srgbClr val="FFFFFF"/>
+                </a:solidFill>
+              </a14:hiddenFill>
+            </a:ext>
+          </a:extLst>
+        </p:spPr>
+        <p:txBody>
+          <a:bodyPr vert="horz" wrap="square" lIns="91440" tIns="45720" rIns="91440" bIns="45720" numCol="1" anchor="t" anchorCtr="0" compatLnSpc="1">
+            <a:prstTxWarp prst="textNoShape">
+              <a:avLst/>
+            </a:prstTxWarp>
+          </a:bodyPr>
+          <a:lstStyle/>
+          <a:p>
+            <a:endParaRPr lang="pt-BR"/>
+          </a:p>
+        </p:txBody>
+      </p:sp>
+      <p:pic>
+        <p:nvPicPr>
+          <p:cNvPr id="1030" name="Picture 6" descr="Resultado de imagem para flying robot"/>
+          <p:cNvPicPr>
+            <a:picLocks noChangeAspect="1" noChangeArrowheads="1"/>
+          </p:cNvPicPr>
+          <p:nvPr/>
+        </p:nvPicPr>
+        <p:blipFill>
+          <a:blip r:embed="rId5">
+            <a:extLst>
+              <a:ext uri="{28A0092B-C50C-407E-A947-70E740481C1C}">
+                <a14:useLocalDpi xmlns:a14="http://schemas.microsoft.com/office/drawing/2010/main" val="0"/>
+              </a:ext>
+            </a:extLst>
+          </a:blip>
+          <a:srcRect/>
+          <a:stretch>
+            <a:fillRect/>
+          </a:stretch>
+        </p:blipFill>
+        <p:spPr bwMode="auto">
+          <a:xfrm>
+            <a:off x="3181350" y="1525886"/>
+            <a:ext cx="2932728" cy="1951598"/>
+          </a:xfrm>
+          <a:prstGeom prst="rect">
+            <a:avLst/>
+          </a:prstGeom>
+          <a:noFill/>
+          <a:extLst>
+            <a:ext uri="{909E8E84-426E-40DD-AFC4-6F175D3DCCD1}">
+              <a14:hiddenFill xmlns:a14="http://schemas.microsoft.com/office/drawing/2010/main">
+                <a:solidFill>
+                  <a:srgbClr val="FFFFFF"/>
+                </a:solidFill>
+              </a14:hiddenFill>
+            </a:ext>
+          </a:extLst>
+        </p:spPr>
+      </p:pic>
+      <p:pic>
+        <p:nvPicPr>
+          <p:cNvPr id="1032" name="Picture 8" descr="Resultado de imagem para extraterrestrial exploration robot"/>
+          <p:cNvPicPr>
+            <a:picLocks noChangeAspect="1" noChangeArrowheads="1"/>
+          </p:cNvPicPr>
+          <p:nvPr/>
+        </p:nvPicPr>
+        <p:blipFill>
+          <a:blip r:embed="rId6">
+            <a:extLst>
+              <a:ext uri="{28A0092B-C50C-407E-A947-70E740481C1C}">
+                <a14:useLocalDpi xmlns:a14="http://schemas.microsoft.com/office/drawing/2010/main" val="0"/>
+              </a:ext>
+            </a:extLst>
+          </a:blip>
+          <a:srcRect/>
+          <a:stretch>
+            <a:fillRect/>
+          </a:stretch>
+        </p:blipFill>
+        <p:spPr bwMode="auto">
+          <a:xfrm>
+            <a:off x="346544" y="1457891"/>
+            <a:ext cx="2809297" cy="2087588"/>
+          </a:xfrm>
+          <a:prstGeom prst="rect">
+            <a:avLst/>
+          </a:prstGeom>
+          <a:noFill/>
+          <a:extLst>
+            <a:ext uri="{909E8E84-426E-40DD-AFC4-6F175D3DCCD1}">
+              <a14:hiddenFill xmlns:a14="http://schemas.microsoft.com/office/drawing/2010/main">
+                <a:solidFill>
+                  <a:srgbClr val="FFFFFF"/>
+                </a:solidFill>
+              </a14:hiddenFill>
+            </a:ext>
+          </a:extLst>
+        </p:spPr>
+      </p:pic>
+      <p:sp>
+        <p:nvSpPr>
+          <p:cNvPr id="8" name="AutoShape 10" descr="Resultado de imagem para p3-dx"/>
+          <p:cNvSpPr>
+            <a:spLocks noChangeAspect="1" noChangeArrowheads="1"/>
+          </p:cNvSpPr>
+          <p:nvPr/>
+        </p:nvSpPr>
+        <p:spPr bwMode="auto">
+          <a:xfrm>
+            <a:off x="307975" y="7937"/>
+            <a:ext cx="304800" cy="304801"/>
+          </a:xfrm>
+          <a:prstGeom prst="rect">
+            <a:avLst/>
+          </a:prstGeom>
+          <a:noFill/>
+          <a:extLst>
+            <a:ext uri="{909E8E84-426E-40DD-AFC4-6F175D3DCCD1}">
+              <a14:hiddenFill xmlns:a14="http://schemas.microsoft.com/office/drawing/2010/main">
+                <a:solidFill>
+                  <a:srgbClr val="FFFFFF"/>
+                </a:solidFill>
+              </a14:hiddenFill>
+            </a:ext>
+          </a:extLst>
+        </p:spPr>
+        <p:txBody>
+          <a:bodyPr vert="horz" wrap="square" lIns="91440" tIns="45720" rIns="91440" bIns="45720" numCol="1" anchor="t" anchorCtr="0" compatLnSpc="1">
+            <a:prstTxWarp prst="textNoShape">
+              <a:avLst/>
+            </a:prstTxWarp>
+          </a:bodyPr>
+          <a:lstStyle/>
+          <a:p>
+            <a:endParaRPr lang="pt-BR"/>
+          </a:p>
+        </p:txBody>
+      </p:sp>
+      <p:sp>
+        <p:nvSpPr>
+          <p:cNvPr id="9" name="AutoShape 12" descr="Resultado de imagem para p3-dx"/>
+          <p:cNvSpPr>
+            <a:spLocks noChangeAspect="1" noChangeArrowheads="1"/>
+          </p:cNvSpPr>
+          <p:nvPr/>
+        </p:nvSpPr>
+        <p:spPr bwMode="auto">
+          <a:xfrm>
+            <a:off x="460375" y="160337"/>
+            <a:ext cx="304800" cy="304801"/>
+          </a:xfrm>
+          <a:prstGeom prst="rect">
+            <a:avLst/>
+          </a:prstGeom>
+          <a:noFill/>
+          <a:extLst>
+            <a:ext uri="{909E8E84-426E-40DD-AFC4-6F175D3DCCD1}">
+              <a14:hiddenFill xmlns:a14="http://schemas.microsoft.com/office/drawing/2010/main">
+                <a:solidFill>
+                  <a:srgbClr val="FFFFFF"/>
+                </a:solidFill>
+              </a14:hiddenFill>
+            </a:ext>
+          </a:extLst>
+        </p:spPr>
+        <p:txBody>
+          <a:bodyPr vert="horz" wrap="square" lIns="91440" tIns="45720" rIns="91440" bIns="45720" numCol="1" anchor="t" anchorCtr="0" compatLnSpc="1">
+            <a:prstTxWarp prst="textNoShape">
+              <a:avLst/>
+            </a:prstTxWarp>
+          </a:bodyPr>
+          <a:lstStyle/>
+          <a:p>
+            <a:endParaRPr lang="pt-BR"/>
+          </a:p>
+        </p:txBody>
+      </p:sp>
+      <p:sp>
+        <p:nvSpPr>
+          <p:cNvPr id="10" name="AutoShape 14" descr="Resultado de imagem para p3-dx"/>
+          <p:cNvSpPr>
+            <a:spLocks noChangeAspect="1" noChangeArrowheads="1"/>
+          </p:cNvSpPr>
+          <p:nvPr/>
+        </p:nvSpPr>
+        <p:spPr bwMode="auto">
+          <a:xfrm>
+            <a:off x="612775" y="312737"/>
+            <a:ext cx="304800" cy="304801"/>
+          </a:xfrm>
+          <a:prstGeom prst="rect">
+            <a:avLst/>
+          </a:prstGeom>
+          <a:noFill/>
+          <a:extLst>
+            <a:ext uri="{909E8E84-426E-40DD-AFC4-6F175D3DCCD1}">
+              <a14:hiddenFill xmlns:a14="http://schemas.microsoft.com/office/drawing/2010/main">
+                <a:solidFill>
+                  <a:srgbClr val="FFFFFF"/>
+                </a:solidFill>
+              </a14:hiddenFill>
+            </a:ext>
+          </a:extLst>
+        </p:spPr>
+        <p:txBody>
+          <a:bodyPr vert="horz" wrap="square" lIns="91440" tIns="45720" rIns="91440" bIns="45720" numCol="1" anchor="t" anchorCtr="0" compatLnSpc="1">
+            <a:prstTxWarp prst="textNoShape">
+              <a:avLst/>
+            </a:prstTxWarp>
+          </a:bodyPr>
+          <a:lstStyle/>
+          <a:p>
+            <a:endParaRPr lang="pt-BR"/>
+          </a:p>
+        </p:txBody>
+      </p:sp>
+      <p:pic>
+        <p:nvPicPr>
+          <p:cNvPr id="1039" name="Picture 15"/>
+          <p:cNvPicPr>
+            <a:picLocks noChangeAspect="1" noChangeArrowheads="1"/>
+          </p:cNvPicPr>
+          <p:nvPr/>
+        </p:nvPicPr>
+        <p:blipFill>
+          <a:blip r:embed="rId7">
+            <a:extLst>
+              <a:ext uri="{28A0092B-C50C-407E-A947-70E740481C1C}">
+                <a14:useLocalDpi xmlns:a14="http://schemas.microsoft.com/office/drawing/2010/main" val="0"/>
+              </a:ext>
+            </a:extLst>
+          </a:blip>
+          <a:srcRect/>
+          <a:stretch>
+            <a:fillRect/>
+          </a:stretch>
+        </p:blipFill>
+        <p:spPr bwMode="auto">
+          <a:xfrm>
+            <a:off x="3487117" y="3865848"/>
+            <a:ext cx="2480387" cy="2491460"/>
+          </a:xfrm>
+          <a:prstGeom prst="rect">
+            <a:avLst/>
+          </a:prstGeom>
+          <a:noFill/>
+          <a:ln>
+            <a:noFill/>
+          </a:ln>
+          <a:effectLst/>
+          <a:extLst>
+            <a:ext uri="{909E8E84-426E-40DD-AFC4-6F175D3DCCD1}">
+              <a14:hiddenFill xmlns:a14="http://schemas.microsoft.com/office/drawing/2010/main">
+                <a:solidFill>
+                  <a:schemeClr val="accent1"/>
+                </a:solidFill>
+              </a14:hiddenFill>
+            </a:ext>
+            <a:ext uri="{91240B29-F687-4F45-9708-019B960494DF}">
+              <a14:hiddenLine xmlns:a14="http://schemas.microsoft.com/office/drawing/2010/main" w="9525">
+                <a:solidFill>
+                  <a:schemeClr val="tx1"/>
+                </a:solidFill>
+                <a:miter lim="800000"/>
+                <a:headEnd/>
+                <a:tailEnd/>
+              </a14:hiddenLine>
+            </a:ext>
+            <a:ext uri="{AF507438-7753-43E0-B8FC-AC1667EBCBE1}">
+              <a14:hiddenEffects xmlns:a14="http://schemas.microsoft.com/office/drawing/2010/main">
+                <a:effectLst>
+                  <a:outerShdw dist="35921" dir="2700000" algn="ctr" rotWithShape="0">
+                    <a:schemeClr val="bg2"/>
+                  </a:outerShdw>
+                </a:effectLst>
+              </a14:hiddenEffects>
+            </a:ext>
+          </a:extLst>
+        </p:spPr>
+      </p:pic>
+    </p:spTree>
+    <p:extLst>
+      <p:ext uri="{BB962C8B-B14F-4D97-AF65-F5344CB8AC3E}">
         <p14:creationId xmlns:p14="http://schemas.microsoft.com/office/powerpoint/2010/main" val="3428689206"/>
       </p:ext>
     </p:extLst>
@@ -5953,18 +6441,12 @@
               <a:rPr lang="pt-BR" dirty="0" smtClean="0"/>
               <a:t>limitados, ou terem custo de hardware e consumo altos</a:t>
             </a:r>
-            <a:endParaRPr lang="pt-BR" dirty="0" smtClean="0"/>
-          </a:p>
-          <a:p>
-            <a:r>
-              <a:rPr lang="pt-BR" dirty="0" smtClean="0"/>
-              <a:t>Ideia Principal: não se limitar aos recursos (memória, processamento, algoritmos, dados) presentes no robô, utilizando recursos em nuvem (SaaS, </a:t>
-            </a:r>
-            <a:r>
-              <a:rPr lang="pt-BR" dirty="0" smtClean="0"/>
-              <a:t>PaaS, RaaS)</a:t>
-            </a:r>
-            <a:endParaRPr lang="pt-BR" dirty="0" smtClean="0"/>
+          </a:p>
+          <a:p>
+            <a:r>
+              <a:rPr lang="pt-BR" dirty="0" smtClean="0"/>
+              <a:t>Ideia Principal: não se limitar aos recursos (memória, processamento, algoritmos, dados) presentes no robô, utilizando recursos em nuvem (SaaS, PaaS, RaaS)</a:t>
+            </a:r>
           </a:p>
           <a:p>
             <a:pPr lvl="1"/>
@@ -6062,7 +6544,6 @@
               <a:rPr lang="pt-BR" dirty="0" smtClean="0"/>
               <a:t>Aprendizado Coletivo</a:t>
             </a:r>
-            <a:endParaRPr lang="pt-BR" dirty="0" smtClean="0"/>
           </a:p>
           <a:p>
             <a:pPr lvl="1"/>
@@ -6151,19 +6632,7 @@
           <a:p>
             <a:r>
               <a:rPr lang="pt-BR" dirty="0" smtClean="0"/>
-              <a:t>Semelhanças com </a:t>
-            </a:r>
-            <a:r>
-              <a:rPr lang="pt-BR" dirty="0" smtClean="0"/>
-              <a:t>RSSF</a:t>
-            </a:r>
-            <a:r>
-              <a:rPr lang="pt-BR" dirty="0" smtClean="0"/>
-              <a:t> </a:t>
-            </a:r>
-            <a:r>
-              <a:rPr lang="pt-BR" dirty="0" smtClean="0"/>
-              <a:t>e convergência</a:t>
+              <a:t>Semelhanças com RSSF e convergência</a:t>
             </a:r>
             <a:endParaRPr lang="pt-BR" dirty="0"/>
           </a:p>
@@ -6188,25 +6657,13 @@
           <a:p>
             <a:r>
               <a:rPr lang="pt-BR" dirty="0" smtClean="0"/>
-              <a:t>Rede de nós capazes de comunicação </a:t>
-            </a:r>
-            <a:r>
-              <a:rPr lang="pt-BR" dirty="0" smtClean="0"/>
-              <a:t>M2M</a:t>
-            </a:r>
-          </a:p>
-          <a:p>
-            <a:r>
-              <a:rPr lang="pt-BR" dirty="0" smtClean="0"/>
-              <a:t>Dispositivos </a:t>
-            </a:r>
-            <a:r>
-              <a:rPr lang="pt-BR" dirty="0" smtClean="0"/>
-              <a:t>capazes de sensoriamento, processamento, transmissão de </a:t>
-            </a:r>
-            <a:r>
-              <a:rPr lang="pt-BR" dirty="0" smtClean="0"/>
-              <a:t>dados</a:t>
+              <a:t>Rede de nós capazes de comunicação M2M</a:t>
+            </a:r>
+          </a:p>
+          <a:p>
+            <a:r>
+              <a:rPr lang="pt-BR" dirty="0" smtClean="0"/>
+              <a:t>Dispositivos capazes de sensoriamento, processamento, transmissão de dados</a:t>
             </a:r>
           </a:p>
           <a:p>
@@ -6214,14 +6671,12 @@
               <a:rPr lang="pt-BR" dirty="0" smtClean="0"/>
               <a:t>Segurança é uma questão importante</a:t>
             </a:r>
-            <a:endParaRPr lang="pt-BR" dirty="0" smtClean="0"/>
           </a:p>
           <a:p>
             <a:r>
               <a:rPr lang="pt-BR" dirty="0" smtClean="0"/>
               <a:t>Pode-se pensar em uma Rede de Robôs Móveis e Sensores como uma RSSF com nós móveis</a:t>
             </a:r>
-            <a:endParaRPr lang="pt-BR" dirty="0" smtClean="0"/>
           </a:p>
           <a:p>
             <a:r>
@@ -6293,57 +6748,173 @@
           <a:p>
             <a:r>
               <a:rPr lang="pt-BR" dirty="0" smtClean="0"/>
-              <a:t>Internet das Coisas Robóticas</a:t>
+              <a:t>Robôs de baixo custo cooperativos</a:t>
             </a:r>
             <a:endParaRPr lang="pt-BR" dirty="0"/>
           </a:p>
         </p:txBody>
       </p:sp>
-      <p:sp>
-        <p:nvSpPr>
-          <p:cNvPr id="3" name="Content Placeholder 2"/>
-          <p:cNvSpPr>
-            <a:spLocks noGrp="1"/>
-          </p:cNvSpPr>
-          <p:nvPr>
-            <p:ph sz="quarter" idx="1"/>
-          </p:nvPr>
-        </p:nvSpPr>
-        <p:spPr/>
-        <p:txBody>
-          <a:bodyPr/>
-          <a:lstStyle/>
-          <a:p>
-            <a:r>
-              <a:rPr lang="pt-BR" dirty="0" smtClean="0"/>
-              <a:t>Apontado por alguns como o próximo passo da Internet das Coisas, acrescentando novas possibilidades</a:t>
-            </a:r>
-          </a:p>
-          <a:p>
-            <a:r>
-              <a:rPr lang="pt-BR" dirty="0"/>
-              <a:t>Será possível controlar robôs domésticos pela internet da maneira que se controla um termostato por celular</a:t>
-            </a:r>
-          </a:p>
-          <a:p>
-            <a:r>
-              <a:rPr lang="pt-BR" dirty="0" smtClean="0"/>
-              <a:t>Os robôs não se limitam mais aos seus próprios sensores para perceber o ambiente – grande disponibilidade de dados de dispositivos e ambientes inteligentes</a:t>
-            </a:r>
-          </a:p>
-          <a:p>
-            <a:r>
-              <a:rPr lang="pt-BR" dirty="0" smtClean="0"/>
-              <a:t>Robôs poderão usar bases de dados na internet – mapas, receitas, palavras, objetos, movimentos</a:t>
-            </a:r>
-          </a:p>
-          <a:p>
-            <a:endParaRPr lang="pt-BR" dirty="0" smtClean="0"/>
-          </a:p>
-          <a:p>
-            <a:endParaRPr lang="pt-BR" dirty="0" smtClean="0"/>
-          </a:p>
-          <a:p>
+      <p:pic>
+        <p:nvPicPr>
+          <p:cNvPr id="2050" name="Picture 2"/>
+          <p:cNvPicPr>
+            <a:picLocks noChangeAspect="1" noChangeArrowheads="1"/>
+          </p:cNvPicPr>
+          <p:nvPr/>
+        </p:nvPicPr>
+        <p:blipFill>
+          <a:blip r:embed="rId2" cstate="print">
+            <a:extLst>
+              <a:ext uri="{28A0092B-C50C-407E-A947-70E740481C1C}">
+                <a14:useLocalDpi xmlns:a14="http://schemas.microsoft.com/office/drawing/2010/main" val="0"/>
+              </a:ext>
+            </a:extLst>
+          </a:blip>
+          <a:srcRect/>
+          <a:stretch>
+            <a:fillRect/>
+          </a:stretch>
+        </p:blipFill>
+        <p:spPr bwMode="auto">
+          <a:xfrm>
+            <a:off x="465899" y="1484784"/>
+            <a:ext cx="3840427" cy="2880320"/>
+          </a:xfrm>
+          <a:prstGeom prst="rect">
+            <a:avLst/>
+          </a:prstGeom>
+          <a:noFill/>
+          <a:ln>
+            <a:noFill/>
+          </a:ln>
+          <a:effectLst/>
+          <a:extLst>
+            <a:ext uri="{909E8E84-426E-40DD-AFC4-6F175D3DCCD1}">
+              <a14:hiddenFill xmlns:a14="http://schemas.microsoft.com/office/drawing/2010/main">
+                <a:solidFill>
+                  <a:schemeClr val="accent1"/>
+                </a:solidFill>
+              </a14:hiddenFill>
+            </a:ext>
+            <a:ext uri="{91240B29-F687-4F45-9708-019B960494DF}">
+              <a14:hiddenLine xmlns:a14="http://schemas.microsoft.com/office/drawing/2010/main" w="9525">
+                <a:solidFill>
+                  <a:schemeClr val="tx1"/>
+                </a:solidFill>
+                <a:miter lim="800000"/>
+                <a:headEnd/>
+                <a:tailEnd/>
+              </a14:hiddenLine>
+            </a:ext>
+            <a:ext uri="{AF507438-7753-43E0-B8FC-AC1667EBCBE1}">
+              <a14:hiddenEffects xmlns:a14="http://schemas.microsoft.com/office/drawing/2010/main">
+                <a:effectLst>
+                  <a:outerShdw dist="35921" dir="2700000" algn="ctr" rotWithShape="0">
+                    <a:schemeClr val="bg2"/>
+                  </a:outerShdw>
+                </a:effectLst>
+              </a14:hiddenEffects>
+            </a:ext>
+          </a:extLst>
+        </p:spPr>
+      </p:pic>
+      <p:sp>
+        <p:nvSpPr>
+          <p:cNvPr id="4" name="TextBox 3"/>
+          <p:cNvSpPr txBox="1"/>
+          <p:nvPr/>
+        </p:nvSpPr>
+        <p:spPr>
+          <a:xfrm>
+            <a:off x="1691680" y="4476684"/>
+            <a:ext cx="1184940" cy="369332"/>
+          </a:xfrm>
+          <a:prstGeom prst="rect">
+            <a:avLst/>
+          </a:prstGeom>
+          <a:noFill/>
+        </p:spPr>
+        <p:txBody>
+          <a:bodyPr wrap="none" rtlCol="0">
+            <a:spAutoFit/>
+          </a:bodyPr>
+          <a:lstStyle/>
+          <a:p>
+            <a:r>
+              <a:rPr lang="pt-BR" dirty="0" smtClean="0"/>
+              <a:t>Robomote</a:t>
+            </a:r>
+            <a:endParaRPr lang="pt-BR" dirty="0"/>
+          </a:p>
+        </p:txBody>
+      </p:sp>
+      <p:pic>
+        <p:nvPicPr>
+          <p:cNvPr id="2054" name="Picture 6" descr="http://www.hizook.com/files/users/3/Alice_Micro_Robot_Swarm.jpg"/>
+          <p:cNvPicPr>
+            <a:picLocks noChangeAspect="1" noChangeArrowheads="1"/>
+          </p:cNvPicPr>
+          <p:nvPr/>
+        </p:nvPicPr>
+        <p:blipFill>
+          <a:blip r:embed="rId3" cstate="print">
+            <a:extLst>
+              <a:ext uri="{28A0092B-C50C-407E-A947-70E740481C1C}">
+                <a14:useLocalDpi xmlns:a14="http://schemas.microsoft.com/office/drawing/2010/main" val="0"/>
+              </a:ext>
+            </a:extLst>
+          </a:blip>
+          <a:srcRect/>
+          <a:stretch>
+            <a:fillRect/>
+          </a:stretch>
+        </p:blipFill>
+        <p:spPr bwMode="auto">
+          <a:xfrm>
+            <a:off x="4572874" y="1484784"/>
+            <a:ext cx="3936438" cy="2952328"/>
+          </a:xfrm>
+          <a:prstGeom prst="rect">
+            <a:avLst/>
+          </a:prstGeom>
+          <a:noFill/>
+          <a:extLst>
+            <a:ext uri="{909E8E84-426E-40DD-AFC4-6F175D3DCCD1}">
+              <a14:hiddenFill xmlns:a14="http://schemas.microsoft.com/office/drawing/2010/main">
+                <a:solidFill>
+                  <a:srgbClr val="FFFFFF"/>
+                </a:solidFill>
+              </a14:hiddenFill>
+            </a:ext>
+          </a:extLst>
+        </p:spPr>
+      </p:pic>
+      <p:sp>
+        <p:nvSpPr>
+          <p:cNvPr id="8" name="TextBox 7"/>
+          <p:cNvSpPr txBox="1"/>
+          <p:nvPr/>
+        </p:nvSpPr>
+        <p:spPr>
+          <a:xfrm>
+            <a:off x="6084168" y="4487464"/>
+            <a:ext cx="652743" cy="369332"/>
+          </a:xfrm>
+          <a:prstGeom prst="rect">
+            <a:avLst/>
+          </a:prstGeom>
+          <a:noFill/>
+        </p:spPr>
+        <p:txBody>
+          <a:bodyPr wrap="none" rtlCol="0">
+            <a:spAutoFit/>
+          </a:bodyPr>
+          <a:lstStyle/>
+          <a:p>
+            <a:r>
+              <a:rPr lang="pt-BR" dirty="0" smtClean="0"/>
+              <a:t>Alice</a:t>
+            </a:r>
             <a:endParaRPr lang="pt-BR" dirty="0"/>
           </a:p>
         </p:txBody>
@@ -6351,7 +6922,7 @@
     </p:spTree>
     <p:extLst>
       <p:ext uri="{BB962C8B-B14F-4D97-AF65-F5344CB8AC3E}">
-        <p14:creationId xmlns:p14="http://schemas.microsoft.com/office/powerpoint/2010/main" val="2543123065"/>
+        <p14:creationId xmlns:p14="http://schemas.microsoft.com/office/powerpoint/2010/main" val="3308404715"/>
       </p:ext>
     </p:extLst>
   </p:cSld>

</xml_diff>